<commit_message>
PPT and jpg image added
</commit_message>
<xml_diff>
--- a/LearningApi/EuclideanColorFilter/Documentation/Updated_Documents/Presentation_DeepaliBetkar.pptx
+++ b/LearningApi/EuclideanColorFilter/Documentation/Updated_Documents/Presentation_DeepaliBetkar.pptx
@@ -116,10 +116,21 @@
   </p:defaultTextStyle>
   <p:extLst>
     <p:ext uri="{EFAFB233-063F-42B5-8137-9DF3F51BA10A}">
-      <p15:sldGuideLst xmlns="" xmlns:p15="http://schemas.microsoft.com/office/powerpoint/2012/main"/>
+      <p15:sldGuideLst xmlns:p15="http://schemas.microsoft.com/office/powerpoint/2012/main">
+        <p15:guide id="1" orient="horz" pos="2160">
+          <p15:clr>
+            <a:srgbClr val="A4A3A4"/>
+          </p15:clr>
+        </p15:guide>
+        <p15:guide id="2" pos="3840">
+          <p15:clr>
+            <a:srgbClr val="A4A3A4"/>
+          </p15:clr>
+        </p15:guide>
+      </p15:sldGuideLst>
     </p:ext>
     <p:ext uri="{2D200454-40CA-4A62-9FC3-DE9A4176ACB9}">
-      <p15:notesGuideLst xmlns="" xmlns:p15="http://schemas.microsoft.com/office/powerpoint/2012/main"/>
+      <p15:notesGuideLst xmlns:p15="http://schemas.microsoft.com/office/powerpoint/2012/main"/>
     </p:ext>
   </p:extLst>
 </p:presentation>
@@ -130,7 +141,7 @@
   <p:cmAuthor id="1" name="Tu Pham" initials="TP" lastIdx="3" clrIdx="0">
     <p:extLst>
       <p:ext uri="{19B8F6BF-5375-455C-9EA6-DF929625EA0E}">
-        <p15:presenceInfo xmlns="" xmlns:p15="http://schemas.microsoft.com/office/powerpoint/2012/main" userId="59a13301e9d76033" providerId="Windows Live"/>
+        <p15:presenceInfo xmlns:p15="http://schemas.microsoft.com/office/powerpoint/2012/main" userId="59a13301e9d76033" providerId="Windows Live"/>
       </p:ext>
     </p:extLst>
   </p:cmAuthor>
@@ -219,7 +230,7 @@
           <a:p>
             <a:fld id="{2ADD04EE-4B2D-4D5F-94B5-665F191DC937}" type="datetimeFigureOut">
               <a:rPr lang="en-US" smtClean="0"/>
-              <a:t>2/10/2019</a:t>
+              <a:t>3/29/2020</a:t>
             </a:fld>
             <a:endParaRPr lang="en-US"/>
           </a:p>
@@ -283,38 +294,37 @@
           <a:p>
             <a:pPr lvl="0"/>
             <a:r>
-              <a:rPr lang="en-US" smtClean="0"/>
+              <a:rPr lang="en-US"/>
               <a:t>Click to edit Master text styles</a:t>
             </a:r>
           </a:p>
           <a:p>
             <a:pPr lvl="1"/>
             <a:r>
-              <a:rPr lang="en-US" smtClean="0"/>
+              <a:rPr lang="en-US"/>
               <a:t>Second level</a:t>
             </a:r>
           </a:p>
           <a:p>
             <a:pPr lvl="2"/>
             <a:r>
-              <a:rPr lang="en-US" smtClean="0"/>
+              <a:rPr lang="en-US"/>
               <a:t>Third level</a:t>
             </a:r>
           </a:p>
           <a:p>
             <a:pPr lvl="3"/>
             <a:r>
-              <a:rPr lang="en-US" smtClean="0"/>
+              <a:rPr lang="en-US"/>
               <a:t>Fourth level</a:t>
             </a:r>
           </a:p>
           <a:p>
             <a:pPr lvl="4"/>
             <a:r>
-              <a:rPr lang="en-US" smtClean="0"/>
+              <a:rPr lang="en-US"/>
               <a:t>Fifth level</a:t>
             </a:r>
-            <a:endParaRPr lang="en-US"/>
           </a:p>
         </p:txBody>
       </p:sp>
@@ -378,7 +388,7 @@
           <a:p>
             <a:fld id="{1C5878D1-4022-408F-A348-5B609B22684C}" type="slidenum">
               <a:rPr lang="en-US" smtClean="0"/>
-              <a:t>‹Nr.›</a:t>
+              <a:t>‹#›</a:t>
             </a:fld>
             <a:endParaRPr lang="en-US"/>
           </a:p>
@@ -532,17 +542,17 @@
           <a:lstStyle/>
           <a:p>
             <a:r>
-              <a:rPr lang="en-US" dirty="0" smtClean="0"/>
+              <a:rPr lang="en-US" dirty="0"/>
               <a:t>Good</a:t>
             </a:r>
             <a:r>
-              <a:rPr lang="en-US" baseline="0" dirty="0" smtClean="0"/>
+              <a:rPr lang="en-US" baseline="0" dirty="0"/>
               <a:t> morning, Professor Trick and everyone. Today, I am going to introduce to you about Service Layer Core Protocol. </a:t>
             </a:r>
           </a:p>
           <a:p>
             <a:r>
-              <a:rPr lang="en-US" baseline="0" dirty="0" smtClean="0"/>
+              <a:rPr lang="en-US" baseline="0" dirty="0"/>
               <a:t> 	</a:t>
             </a:r>
             <a:endParaRPr lang="en-US" dirty="0"/>
@@ -630,17 +640,17 @@
           <a:lstStyle/>
           <a:p>
             <a:r>
-              <a:rPr lang="en-US" dirty="0" smtClean="0"/>
+              <a:rPr lang="en-US" dirty="0"/>
               <a:t>In</a:t>
             </a:r>
             <a:r>
-              <a:rPr lang="en-US" baseline="0" dirty="0" smtClean="0"/>
+              <a:rPr lang="en-US" baseline="0" dirty="0"/>
               <a:t> my presentation, I will follow this agenda. Firstly, the brief definition and the goal of Service Layer is shown. In the next part, the architectural of Service Layer is explained in details. </a:t>
             </a:r>
           </a:p>
           <a:p>
             <a:r>
-              <a:rPr lang="en-US" baseline="0" dirty="0" smtClean="0"/>
+              <a:rPr lang="en-US" baseline="0" dirty="0"/>
               <a:t>And then principles and functions are mentioned. Finally is the reference.</a:t>
             </a:r>
           </a:p>
@@ -811,10 +821,9 @@
           </a:lstStyle>
           <a:p>
             <a:r>
-              <a:rPr lang="en-US" smtClean="0"/>
+              <a:rPr lang="en-US"/>
               <a:t>Click to edit Master title style</a:t>
             </a:r>
-            <a:endParaRPr lang="en-US"/>
           </a:p>
         </p:txBody>
       </p:sp>
@@ -876,10 +885,9 @@
           </a:lstStyle>
           <a:p>
             <a:r>
-              <a:rPr lang="en-US" smtClean="0"/>
+              <a:rPr lang="en-US"/>
               <a:t>Click to edit Master subtitle style</a:t>
             </a:r>
-            <a:endParaRPr lang="en-US"/>
           </a:p>
         </p:txBody>
       </p:sp>
@@ -900,7 +908,7 @@
           <a:p>
             <a:fld id="{328A4961-FF9D-469C-8EE9-5567999B4E40}" type="datetime1">
               <a:rPr lang="en-US" smtClean="0"/>
-              <a:t>2/10/2019</a:t>
+              <a:t>3/29/2020</a:t>
             </a:fld>
             <a:endParaRPr lang="en-US"/>
           </a:p>
@@ -942,7 +950,7 @@
           <a:p>
             <a:fld id="{AA3D989F-99AA-4CFF-8FB2-A57B661395BB}" type="slidenum">
               <a:rPr lang="en-US" smtClean="0"/>
-              <a:t>‹Nr.›</a:t>
+              <a:t>‹#›</a:t>
             </a:fld>
             <a:endParaRPr lang="en-US"/>
           </a:p>
@@ -994,10 +1002,9 @@
           <a:lstStyle/>
           <a:p>
             <a:r>
-              <a:rPr lang="en-US" smtClean="0"/>
+              <a:rPr lang="en-US"/>
               <a:t>Click to edit Master title style</a:t>
             </a:r>
-            <a:endParaRPr lang="en-US"/>
           </a:p>
         </p:txBody>
       </p:sp>
@@ -1018,38 +1025,37 @@
           <a:p>
             <a:pPr lvl="0"/>
             <a:r>
-              <a:rPr lang="en-US" smtClean="0"/>
+              <a:rPr lang="en-US"/>
               <a:t>Click to edit Master text styles</a:t>
             </a:r>
           </a:p>
           <a:p>
             <a:pPr lvl="1"/>
             <a:r>
-              <a:rPr lang="en-US" smtClean="0"/>
+              <a:rPr lang="en-US"/>
               <a:t>Second level</a:t>
             </a:r>
           </a:p>
           <a:p>
             <a:pPr lvl="2"/>
             <a:r>
-              <a:rPr lang="en-US" smtClean="0"/>
+              <a:rPr lang="en-US"/>
               <a:t>Third level</a:t>
             </a:r>
           </a:p>
           <a:p>
             <a:pPr lvl="3"/>
             <a:r>
-              <a:rPr lang="en-US" smtClean="0"/>
+              <a:rPr lang="en-US"/>
               <a:t>Fourth level</a:t>
             </a:r>
           </a:p>
           <a:p>
             <a:pPr lvl="4"/>
             <a:r>
-              <a:rPr lang="en-US" smtClean="0"/>
+              <a:rPr lang="en-US"/>
               <a:t>Fifth level</a:t>
             </a:r>
-            <a:endParaRPr lang="en-US"/>
           </a:p>
         </p:txBody>
       </p:sp>
@@ -1070,7 +1076,7 @@
           <a:p>
             <a:fld id="{3A0C2AFB-5AE3-4A63-BDBD-C1E150B42C4F}" type="datetime1">
               <a:rPr lang="en-US" smtClean="0"/>
-              <a:t>2/10/2019</a:t>
+              <a:t>3/29/2020</a:t>
             </a:fld>
             <a:endParaRPr lang="en-US"/>
           </a:p>
@@ -1112,7 +1118,7 @@
           <a:p>
             <a:fld id="{AA3D989F-99AA-4CFF-8FB2-A57B661395BB}" type="slidenum">
               <a:rPr lang="en-US" smtClean="0"/>
-              <a:t>‹Nr.›</a:t>
+              <a:t>‹#›</a:t>
             </a:fld>
             <a:endParaRPr lang="en-US"/>
           </a:p>
@@ -1169,10 +1175,9 @@
           <a:lstStyle/>
           <a:p>
             <a:r>
-              <a:rPr lang="en-US" smtClean="0"/>
+              <a:rPr lang="en-US"/>
               <a:t>Click to edit Master title style</a:t>
             </a:r>
-            <a:endParaRPr lang="en-US"/>
           </a:p>
         </p:txBody>
       </p:sp>
@@ -1198,38 +1203,37 @@
           <a:p>
             <a:pPr lvl="0"/>
             <a:r>
-              <a:rPr lang="en-US" smtClean="0"/>
+              <a:rPr lang="en-US"/>
               <a:t>Click to edit Master text styles</a:t>
             </a:r>
           </a:p>
           <a:p>
             <a:pPr lvl="1"/>
             <a:r>
-              <a:rPr lang="en-US" smtClean="0"/>
+              <a:rPr lang="en-US"/>
               <a:t>Second level</a:t>
             </a:r>
           </a:p>
           <a:p>
             <a:pPr lvl="2"/>
             <a:r>
-              <a:rPr lang="en-US" smtClean="0"/>
+              <a:rPr lang="en-US"/>
               <a:t>Third level</a:t>
             </a:r>
           </a:p>
           <a:p>
             <a:pPr lvl="3"/>
             <a:r>
-              <a:rPr lang="en-US" smtClean="0"/>
+              <a:rPr lang="en-US"/>
               <a:t>Fourth level</a:t>
             </a:r>
           </a:p>
           <a:p>
             <a:pPr lvl="4"/>
             <a:r>
-              <a:rPr lang="en-US" smtClean="0"/>
+              <a:rPr lang="en-US"/>
               <a:t>Fifth level</a:t>
             </a:r>
-            <a:endParaRPr lang="en-US"/>
           </a:p>
         </p:txBody>
       </p:sp>
@@ -1250,7 +1254,7 @@
           <a:p>
             <a:fld id="{C0DD8E5B-6BB7-4CC6-A4F1-195E8456E825}" type="datetime1">
               <a:rPr lang="en-US" smtClean="0"/>
-              <a:t>2/10/2019</a:t>
+              <a:t>3/29/2020</a:t>
             </a:fld>
             <a:endParaRPr lang="en-US"/>
           </a:p>
@@ -1292,7 +1296,7 @@
           <a:p>
             <a:fld id="{AA3D989F-99AA-4CFF-8FB2-A57B661395BB}" type="slidenum">
               <a:rPr lang="en-US" smtClean="0"/>
-              <a:t>‹Nr.›</a:t>
+              <a:t>‹#›</a:t>
             </a:fld>
             <a:endParaRPr lang="en-US"/>
           </a:p>
@@ -1344,10 +1348,9 @@
           <a:lstStyle/>
           <a:p>
             <a:r>
-              <a:rPr lang="en-US" smtClean="0"/>
+              <a:rPr lang="en-US"/>
               <a:t>Click to edit Master title style</a:t>
             </a:r>
-            <a:endParaRPr lang="en-US"/>
           </a:p>
         </p:txBody>
       </p:sp>
@@ -1368,38 +1371,37 @@
           <a:p>
             <a:pPr lvl="0"/>
             <a:r>
-              <a:rPr lang="en-US" smtClean="0"/>
+              <a:rPr lang="en-US"/>
               <a:t>Click to edit Master text styles</a:t>
             </a:r>
           </a:p>
           <a:p>
             <a:pPr lvl="1"/>
             <a:r>
-              <a:rPr lang="en-US" smtClean="0"/>
+              <a:rPr lang="en-US"/>
               <a:t>Second level</a:t>
             </a:r>
           </a:p>
           <a:p>
             <a:pPr lvl="2"/>
             <a:r>
-              <a:rPr lang="en-US" smtClean="0"/>
+              <a:rPr lang="en-US"/>
               <a:t>Third level</a:t>
             </a:r>
           </a:p>
           <a:p>
             <a:pPr lvl="3"/>
             <a:r>
-              <a:rPr lang="en-US" smtClean="0"/>
+              <a:rPr lang="en-US"/>
               <a:t>Fourth level</a:t>
             </a:r>
           </a:p>
           <a:p>
             <a:pPr lvl="4"/>
             <a:r>
-              <a:rPr lang="en-US" smtClean="0"/>
+              <a:rPr lang="en-US"/>
               <a:t>Fifth level</a:t>
             </a:r>
-            <a:endParaRPr lang="en-US"/>
           </a:p>
         </p:txBody>
       </p:sp>
@@ -1420,7 +1422,7 @@
           <a:p>
             <a:fld id="{394AC6AB-77EA-45F3-84DA-77F2B14AC545}" type="datetime1">
               <a:rPr lang="en-US" smtClean="0"/>
-              <a:t>2/10/2019</a:t>
+              <a:t>3/29/2020</a:t>
             </a:fld>
             <a:endParaRPr lang="en-US"/>
           </a:p>
@@ -1462,7 +1464,7 @@
           <a:p>
             <a:fld id="{AA3D989F-99AA-4CFF-8FB2-A57B661395BB}" type="slidenum">
               <a:rPr lang="en-US" smtClean="0"/>
-              <a:t>‹Nr.›</a:t>
+              <a:t>‹#›</a:t>
             </a:fld>
             <a:endParaRPr lang="en-US"/>
           </a:p>
@@ -1523,10 +1525,9 @@
           </a:lstStyle>
           <a:p>
             <a:r>
-              <a:rPr lang="en-US" smtClean="0"/>
+              <a:rPr lang="en-US"/>
               <a:t>Click to edit Master title style</a:t>
             </a:r>
-            <a:endParaRPr lang="en-US"/>
           </a:p>
         </p:txBody>
       </p:sp>
@@ -1643,7 +1644,7 @@
           <a:p>
             <a:pPr lvl="0"/>
             <a:r>
-              <a:rPr lang="en-US" smtClean="0"/>
+              <a:rPr lang="en-US"/>
               <a:t>Click to edit Master text styles</a:t>
             </a:r>
           </a:p>
@@ -1666,7 +1667,7 @@
           <a:p>
             <a:fld id="{D98C9CB4-88A4-4B22-BA1B-73C075A3E012}" type="datetime1">
               <a:rPr lang="en-US" smtClean="0"/>
-              <a:t>2/10/2019</a:t>
+              <a:t>3/29/2020</a:t>
             </a:fld>
             <a:endParaRPr lang="en-US"/>
           </a:p>
@@ -1708,7 +1709,7 @@
           <a:p>
             <a:fld id="{AA3D989F-99AA-4CFF-8FB2-A57B661395BB}" type="slidenum">
               <a:rPr lang="en-US" smtClean="0"/>
-              <a:t>‹Nr.›</a:t>
+              <a:t>‹#›</a:t>
             </a:fld>
             <a:endParaRPr lang="en-US"/>
           </a:p>
@@ -1760,10 +1761,9 @@
           <a:lstStyle/>
           <a:p>
             <a:r>
-              <a:rPr lang="en-US" smtClean="0"/>
+              <a:rPr lang="en-US"/>
               <a:t>Click to edit Master title style</a:t>
             </a:r>
-            <a:endParaRPr lang="en-US"/>
           </a:p>
         </p:txBody>
       </p:sp>
@@ -1789,38 +1789,37 @@
           <a:p>
             <a:pPr lvl="0"/>
             <a:r>
-              <a:rPr lang="en-US" smtClean="0"/>
+              <a:rPr lang="en-US"/>
               <a:t>Click to edit Master text styles</a:t>
             </a:r>
           </a:p>
           <a:p>
             <a:pPr lvl="1"/>
             <a:r>
-              <a:rPr lang="en-US" smtClean="0"/>
+              <a:rPr lang="en-US"/>
               <a:t>Second level</a:t>
             </a:r>
           </a:p>
           <a:p>
             <a:pPr lvl="2"/>
             <a:r>
-              <a:rPr lang="en-US" smtClean="0"/>
+              <a:rPr lang="en-US"/>
               <a:t>Third level</a:t>
             </a:r>
           </a:p>
           <a:p>
             <a:pPr lvl="3"/>
             <a:r>
-              <a:rPr lang="en-US" smtClean="0"/>
+              <a:rPr lang="en-US"/>
               <a:t>Fourth level</a:t>
             </a:r>
           </a:p>
           <a:p>
             <a:pPr lvl="4"/>
             <a:r>
-              <a:rPr lang="en-US" smtClean="0"/>
+              <a:rPr lang="en-US"/>
               <a:t>Fifth level</a:t>
             </a:r>
-            <a:endParaRPr lang="en-US"/>
           </a:p>
         </p:txBody>
       </p:sp>
@@ -1846,38 +1845,37 @@
           <a:p>
             <a:pPr lvl="0"/>
             <a:r>
-              <a:rPr lang="en-US" smtClean="0"/>
+              <a:rPr lang="en-US"/>
               <a:t>Click to edit Master text styles</a:t>
             </a:r>
           </a:p>
           <a:p>
             <a:pPr lvl="1"/>
             <a:r>
-              <a:rPr lang="en-US" smtClean="0"/>
+              <a:rPr lang="en-US"/>
               <a:t>Second level</a:t>
             </a:r>
           </a:p>
           <a:p>
             <a:pPr lvl="2"/>
             <a:r>
-              <a:rPr lang="en-US" smtClean="0"/>
+              <a:rPr lang="en-US"/>
               <a:t>Third level</a:t>
             </a:r>
           </a:p>
           <a:p>
             <a:pPr lvl="3"/>
             <a:r>
-              <a:rPr lang="en-US" smtClean="0"/>
+              <a:rPr lang="en-US"/>
               <a:t>Fourth level</a:t>
             </a:r>
           </a:p>
           <a:p>
             <a:pPr lvl="4"/>
             <a:r>
-              <a:rPr lang="en-US" smtClean="0"/>
+              <a:rPr lang="en-US"/>
               <a:t>Fifth level</a:t>
             </a:r>
-            <a:endParaRPr lang="en-US"/>
           </a:p>
         </p:txBody>
       </p:sp>
@@ -1898,7 +1896,7 @@
           <a:p>
             <a:fld id="{8DC21607-A455-4D64-98FE-69A2A848B27A}" type="datetime1">
               <a:rPr lang="en-US" smtClean="0"/>
-              <a:t>2/10/2019</a:t>
+              <a:t>3/29/2020</a:t>
             </a:fld>
             <a:endParaRPr lang="en-US"/>
           </a:p>
@@ -1940,7 +1938,7 @@
           <a:p>
             <a:fld id="{AA3D989F-99AA-4CFF-8FB2-A57B661395BB}" type="slidenum">
               <a:rPr lang="en-US" smtClean="0"/>
-              <a:t>‹Nr.›</a:t>
+              <a:t>‹#›</a:t>
             </a:fld>
             <a:endParaRPr lang="en-US"/>
           </a:p>
@@ -1997,10 +1995,9 @@
           <a:lstStyle/>
           <a:p>
             <a:r>
-              <a:rPr lang="en-US" smtClean="0"/>
+              <a:rPr lang="en-US"/>
               <a:t>Click to edit Master title style</a:t>
             </a:r>
-            <a:endParaRPr lang="en-US"/>
           </a:p>
         </p:txBody>
       </p:sp>
@@ -2063,7 +2060,7 @@
           <a:p>
             <a:pPr lvl="0"/>
             <a:r>
-              <a:rPr lang="en-US" smtClean="0"/>
+              <a:rPr lang="en-US"/>
               <a:t>Click to edit Master text styles</a:t>
             </a:r>
           </a:p>
@@ -2091,38 +2088,37 @@
           <a:p>
             <a:pPr lvl="0"/>
             <a:r>
-              <a:rPr lang="en-US" smtClean="0"/>
+              <a:rPr lang="en-US"/>
               <a:t>Click to edit Master text styles</a:t>
             </a:r>
           </a:p>
           <a:p>
             <a:pPr lvl="1"/>
             <a:r>
-              <a:rPr lang="en-US" smtClean="0"/>
+              <a:rPr lang="en-US"/>
               <a:t>Second level</a:t>
             </a:r>
           </a:p>
           <a:p>
             <a:pPr lvl="2"/>
             <a:r>
-              <a:rPr lang="en-US" smtClean="0"/>
+              <a:rPr lang="en-US"/>
               <a:t>Third level</a:t>
             </a:r>
           </a:p>
           <a:p>
             <a:pPr lvl="3"/>
             <a:r>
-              <a:rPr lang="en-US" smtClean="0"/>
+              <a:rPr lang="en-US"/>
               <a:t>Fourth level</a:t>
             </a:r>
           </a:p>
           <a:p>
             <a:pPr lvl="4"/>
             <a:r>
-              <a:rPr lang="en-US" smtClean="0"/>
+              <a:rPr lang="en-US"/>
               <a:t>Fifth level</a:t>
             </a:r>
-            <a:endParaRPr lang="en-US"/>
           </a:p>
         </p:txBody>
       </p:sp>
@@ -2185,7 +2181,7 @@
           <a:p>
             <a:pPr lvl="0"/>
             <a:r>
-              <a:rPr lang="en-US" smtClean="0"/>
+              <a:rPr lang="en-US"/>
               <a:t>Click to edit Master text styles</a:t>
             </a:r>
           </a:p>
@@ -2213,38 +2209,37 @@
           <a:p>
             <a:pPr lvl="0"/>
             <a:r>
-              <a:rPr lang="en-US" smtClean="0"/>
+              <a:rPr lang="en-US"/>
               <a:t>Click to edit Master text styles</a:t>
             </a:r>
           </a:p>
           <a:p>
             <a:pPr lvl="1"/>
             <a:r>
-              <a:rPr lang="en-US" smtClean="0"/>
+              <a:rPr lang="en-US"/>
               <a:t>Second level</a:t>
             </a:r>
           </a:p>
           <a:p>
             <a:pPr lvl="2"/>
             <a:r>
-              <a:rPr lang="en-US" smtClean="0"/>
+              <a:rPr lang="en-US"/>
               <a:t>Third level</a:t>
             </a:r>
           </a:p>
           <a:p>
             <a:pPr lvl="3"/>
             <a:r>
-              <a:rPr lang="en-US" smtClean="0"/>
+              <a:rPr lang="en-US"/>
               <a:t>Fourth level</a:t>
             </a:r>
           </a:p>
           <a:p>
             <a:pPr lvl="4"/>
             <a:r>
-              <a:rPr lang="en-US" smtClean="0"/>
+              <a:rPr lang="en-US"/>
               <a:t>Fifth level</a:t>
             </a:r>
-            <a:endParaRPr lang="en-US"/>
           </a:p>
         </p:txBody>
       </p:sp>
@@ -2265,7 +2260,7 @@
           <a:p>
             <a:fld id="{7DCE7641-0463-4768-80A8-CF24A60E392A}" type="datetime1">
               <a:rPr lang="en-US" smtClean="0"/>
-              <a:t>2/10/2019</a:t>
+              <a:t>3/29/2020</a:t>
             </a:fld>
             <a:endParaRPr lang="en-US"/>
           </a:p>
@@ -2307,7 +2302,7 @@
           <a:p>
             <a:fld id="{AA3D989F-99AA-4CFF-8FB2-A57B661395BB}" type="slidenum">
               <a:rPr lang="en-US" smtClean="0"/>
-              <a:t>‹Nr.›</a:t>
+              <a:t>‹#›</a:t>
             </a:fld>
             <a:endParaRPr lang="en-US"/>
           </a:p>
@@ -2359,10 +2354,9 @@
           <a:lstStyle/>
           <a:p>
             <a:r>
-              <a:rPr lang="en-US" smtClean="0"/>
+              <a:rPr lang="en-US"/>
               <a:t>Click to edit Master title style</a:t>
             </a:r>
-            <a:endParaRPr lang="en-US"/>
           </a:p>
         </p:txBody>
       </p:sp>
@@ -2383,7 +2377,7 @@
           <a:p>
             <a:fld id="{6E6B9EE9-8715-4A09-8BB5-6363817A504A}" type="datetime1">
               <a:rPr lang="en-US" smtClean="0"/>
-              <a:t>2/10/2019</a:t>
+              <a:t>3/29/2020</a:t>
             </a:fld>
             <a:endParaRPr lang="en-US"/>
           </a:p>
@@ -2425,7 +2419,7 @@
           <a:p>
             <a:fld id="{AA3D989F-99AA-4CFF-8FB2-A57B661395BB}" type="slidenum">
               <a:rPr lang="en-US" smtClean="0"/>
-              <a:t>‹Nr.›</a:t>
+              <a:t>‹#›</a:t>
             </a:fld>
             <a:endParaRPr lang="en-US"/>
           </a:p>
@@ -2478,7 +2472,7 @@
           <a:p>
             <a:fld id="{B8908F82-0502-4E25-8FBB-25918D1AE1AF}" type="datetime1">
               <a:rPr lang="en-US" smtClean="0"/>
-              <a:t>2/10/2019</a:t>
+              <a:t>3/29/2020</a:t>
             </a:fld>
             <a:endParaRPr lang="en-US"/>
           </a:p>
@@ -2520,7 +2514,7 @@
           <a:p>
             <a:fld id="{AA3D989F-99AA-4CFF-8FB2-A57B661395BB}" type="slidenum">
               <a:rPr lang="en-US" smtClean="0"/>
-              <a:t>‹Nr.›</a:t>
+              <a:t>‹#›</a:t>
             </a:fld>
             <a:endParaRPr lang="en-US"/>
           </a:p>
@@ -2581,10 +2575,9 @@
           </a:lstStyle>
           <a:p>
             <a:r>
-              <a:rPr lang="en-US" smtClean="0"/>
+              <a:rPr lang="en-US"/>
               <a:t>Click to edit Master title style</a:t>
             </a:r>
-            <a:endParaRPr lang="en-US"/>
           </a:p>
         </p:txBody>
       </p:sp>
@@ -2638,38 +2631,37 @@
           <a:p>
             <a:pPr lvl="0"/>
             <a:r>
-              <a:rPr lang="en-US" smtClean="0"/>
+              <a:rPr lang="en-US"/>
               <a:t>Click to edit Master text styles</a:t>
             </a:r>
           </a:p>
           <a:p>
             <a:pPr lvl="1"/>
             <a:r>
-              <a:rPr lang="en-US" smtClean="0"/>
+              <a:rPr lang="en-US"/>
               <a:t>Second level</a:t>
             </a:r>
           </a:p>
           <a:p>
             <a:pPr lvl="2"/>
             <a:r>
-              <a:rPr lang="en-US" smtClean="0"/>
+              <a:rPr lang="en-US"/>
               <a:t>Third level</a:t>
             </a:r>
           </a:p>
           <a:p>
             <a:pPr lvl="3"/>
             <a:r>
-              <a:rPr lang="en-US" smtClean="0"/>
+              <a:rPr lang="en-US"/>
               <a:t>Fourth level</a:t>
             </a:r>
           </a:p>
           <a:p>
             <a:pPr lvl="4"/>
             <a:r>
-              <a:rPr lang="en-US" smtClean="0"/>
+              <a:rPr lang="en-US"/>
               <a:t>Fifth level</a:t>
             </a:r>
-            <a:endParaRPr lang="en-US"/>
           </a:p>
         </p:txBody>
       </p:sp>
@@ -2732,7 +2724,7 @@
           <a:p>
             <a:pPr lvl="0"/>
             <a:r>
-              <a:rPr lang="en-US" smtClean="0"/>
+              <a:rPr lang="en-US"/>
               <a:t>Click to edit Master text styles</a:t>
             </a:r>
           </a:p>
@@ -2755,7 +2747,7 @@
           <a:p>
             <a:fld id="{2B4FD40B-D4B3-49EE-9A85-0BAFDD171EDB}" type="datetime1">
               <a:rPr lang="en-US" smtClean="0"/>
-              <a:t>2/10/2019</a:t>
+              <a:t>3/29/2020</a:t>
             </a:fld>
             <a:endParaRPr lang="en-US"/>
           </a:p>
@@ -2797,7 +2789,7 @@
           <a:p>
             <a:fld id="{AA3D989F-99AA-4CFF-8FB2-A57B661395BB}" type="slidenum">
               <a:rPr lang="en-US" smtClean="0"/>
-              <a:t>‹Nr.›</a:t>
+              <a:t>‹#›</a:t>
             </a:fld>
             <a:endParaRPr lang="en-US"/>
           </a:p>
@@ -2858,10 +2850,9 @@
           </a:lstStyle>
           <a:p>
             <a:r>
-              <a:rPr lang="en-US" smtClean="0"/>
+              <a:rPr lang="en-US"/>
               <a:t>Click to edit Master title style</a:t>
             </a:r>
-            <a:endParaRPr lang="en-US"/>
           </a:p>
         </p:txBody>
       </p:sp>
@@ -2985,7 +2976,7 @@
           <a:p>
             <a:pPr lvl="0"/>
             <a:r>
-              <a:rPr lang="en-US" smtClean="0"/>
+              <a:rPr lang="en-US"/>
               <a:t>Click to edit Master text styles</a:t>
             </a:r>
           </a:p>
@@ -3008,7 +2999,7 @@
           <a:p>
             <a:fld id="{118E094A-7E36-4593-8F11-F1D3153F8A22}" type="datetime1">
               <a:rPr lang="en-US" smtClean="0"/>
-              <a:t>2/10/2019</a:t>
+              <a:t>3/29/2020</a:t>
             </a:fld>
             <a:endParaRPr lang="en-US"/>
           </a:p>
@@ -3050,7 +3041,7 @@
           <a:p>
             <a:fld id="{AA3D989F-99AA-4CFF-8FB2-A57B661395BB}" type="slidenum">
               <a:rPr lang="en-US" smtClean="0"/>
-              <a:t>‹Nr.›</a:t>
+              <a:t>‹#›</a:t>
             </a:fld>
             <a:endParaRPr lang="en-US"/>
           </a:p>
@@ -3117,10 +3108,9 @@
           <a:lstStyle/>
           <a:p>
             <a:r>
-              <a:rPr lang="en-US" smtClean="0"/>
+              <a:rPr lang="en-US"/>
               <a:t>Click to edit Master title style</a:t>
             </a:r>
-            <a:endParaRPr lang="en-US"/>
           </a:p>
         </p:txBody>
       </p:sp>
@@ -3151,38 +3141,37 @@
           <a:p>
             <a:pPr lvl="0"/>
             <a:r>
-              <a:rPr lang="en-US" smtClean="0"/>
+              <a:rPr lang="en-US"/>
               <a:t>Click to edit Master text styles</a:t>
             </a:r>
           </a:p>
           <a:p>
             <a:pPr lvl="1"/>
             <a:r>
-              <a:rPr lang="en-US" smtClean="0"/>
+              <a:rPr lang="en-US"/>
               <a:t>Second level</a:t>
             </a:r>
           </a:p>
           <a:p>
             <a:pPr lvl="2"/>
             <a:r>
-              <a:rPr lang="en-US" smtClean="0"/>
+              <a:rPr lang="en-US"/>
               <a:t>Third level</a:t>
             </a:r>
           </a:p>
           <a:p>
             <a:pPr lvl="3"/>
             <a:r>
-              <a:rPr lang="en-US" smtClean="0"/>
+              <a:rPr lang="en-US"/>
               <a:t>Fourth level</a:t>
             </a:r>
           </a:p>
           <a:p>
             <a:pPr lvl="4"/>
             <a:r>
-              <a:rPr lang="en-US" smtClean="0"/>
+              <a:rPr lang="en-US"/>
               <a:t>Fifth level</a:t>
             </a:r>
-            <a:endParaRPr lang="en-US"/>
           </a:p>
         </p:txBody>
       </p:sp>
@@ -3221,7 +3210,7 @@
           <a:p>
             <a:fld id="{DCFAF769-FD19-4A19-833A-03277A1DEEC8}" type="datetime1">
               <a:rPr lang="en-US" smtClean="0"/>
-              <a:t>2/10/2019</a:t>
+              <a:t>3/29/2020</a:t>
             </a:fld>
             <a:endParaRPr lang="en-US"/>
           </a:p>
@@ -3299,7 +3288,7 @@
           <a:p>
             <a:fld id="{AA3D989F-99AA-4CFF-8FB2-A57B661395BB}" type="slidenum">
               <a:rPr lang="en-US" smtClean="0"/>
-              <a:t>‹Nr.›</a:t>
+              <a:t>‹#›</a:t>
             </a:fld>
             <a:endParaRPr lang="en-US"/>
           </a:p>
@@ -3651,49 +3640,36 @@
           <a:p>
             <a:pPr algn="l"/>
             <a:r>
-              <a:rPr lang="de-DE" dirty="0" err="1" smtClean="0"/>
+              <a:rPr lang="de-DE" dirty="0" err="1"/>
               <a:t>Lecturer</a:t>
             </a:r>
             <a:r>
-              <a:rPr lang="de-DE" dirty="0" smtClean="0"/>
-              <a:t>: </a:t>
-            </a:r>
-            <a:r>
-              <a:rPr lang="de-DE" dirty="0" smtClean="0"/>
-              <a:t>Mr. Damir Dobric</a:t>
-            </a:r>
-            <a:r>
-              <a:rPr lang="de-DE" sz="4000" dirty="0" smtClean="0"/>
+              <a:rPr lang="de-DE" dirty="0"/>
+              <a:t>: Mr. Damir Dobric</a:t>
+            </a:r>
+            <a:r>
+              <a:rPr lang="de-DE" sz="4000" dirty="0"/>
               <a:t>               </a:t>
             </a:r>
             <a:r>
-              <a:rPr lang="de-DE" dirty="0" smtClean="0"/>
-              <a:t>Student: Sven Eisenbach </a:t>
+              <a:rPr lang="de-DE" dirty="0"/>
+              <a:t>Student: Deepali Ashok Betkar</a:t>
             </a:r>
             <a:br>
-              <a:rPr lang="de-DE" dirty="0" smtClean="0"/>
+              <a:rPr lang="de-DE" dirty="0"/>
             </a:br>
             <a:r>
-              <a:rPr lang="de-DE" dirty="0" smtClean="0"/>
+              <a:rPr lang="de-DE" dirty="0"/>
               <a:t>Professor: Prof. Dr. Andreas Pech	       </a:t>
             </a:r>
             <a:r>
-              <a:rPr lang="de-DE" dirty="0" err="1" smtClean="0"/>
+              <a:rPr lang="de-DE" dirty="0" err="1"/>
               <a:t>Matr</a:t>
             </a:r>
             <a:r>
-              <a:rPr lang="de-DE" dirty="0" smtClean="0"/>
-              <a:t>. </a:t>
-            </a:r>
-            <a:r>
-              <a:rPr lang="de-DE" dirty="0" err="1" smtClean="0"/>
-              <a:t>Nr</a:t>
-            </a:r>
-            <a:r>
-              <a:rPr lang="de-DE" dirty="0" smtClean="0"/>
-              <a:t>: 1092541</a:t>
-            </a:r>
-            <a:endParaRPr lang="de-DE" dirty="0"/>
+              <a:rPr lang="de-DE" dirty="0"/>
+              <a:t>. Nr: 1324536</a:t>
+            </a:r>
           </a:p>
         </p:txBody>
       </p:sp>
@@ -3768,18 +3744,13 @@
           <a:p>
             <a:pPr algn="ctr"/>
             <a:r>
-              <a:rPr lang="de-DE" sz="3200" dirty="0" smtClean="0">
+              <a:rPr lang="de-DE" sz="3200" dirty="0">
                 <a:solidFill>
                   <a:schemeClr val="tx1"/>
                 </a:solidFill>
               </a:rPr>
               <a:t>Software Engineering WS 18/19</a:t>
             </a:r>
-            <a:endParaRPr lang="de-DE" sz="3200" dirty="0">
-              <a:solidFill>
-                <a:schemeClr val="tx1"/>
-              </a:solidFill>
-            </a:endParaRPr>
           </a:p>
         </p:txBody>
       </p:sp>
@@ -3809,7 +3780,7 @@
               <a:rPr lang="en-US" sz="4400" b="1" dirty="0">
                 <a:latin typeface="+mn-lt"/>
               </a:rPr>
-              <a:t>Implementation of an Euclidean Color Filter </a:t>
+              <a:t>Implementation of a Euclidean Color Filter </a:t>
             </a:r>
             <a:br>
               <a:rPr lang="en-US" sz="4400" b="1" dirty="0">
@@ -3850,21 +3821,6 @@
   <p:clrMapOvr>
     <a:masterClrMapping/>
   </p:clrMapOvr>
-  <mc:AlternateContent xmlns:mc="http://schemas.openxmlformats.org/markup-compatibility/2006" xmlns:p14="http://schemas.microsoft.com/office/powerpoint/2010/main">
-    <mc:Choice Requires="p14">
-      <p:transition spd="slow" p14:dur="2000"/>
-    </mc:Choice>
-    <mc:Fallback xmlns="">
-      <p:transition spd="slow"/>
-    </mc:Fallback>
-  </mc:AlternateContent>
-  <p:timing>
-    <p:tnLst>
-      <p:par>
-        <p:cTn id="1" dur="indefinite" restart="never" nodeType="tmRoot"/>
-      </p:par>
-    </p:tnLst>
-  </p:timing>
 </p:sld>
 </file>
 
@@ -3901,14 +3857,9 @@
           <a:lstStyle/>
           <a:p>
             <a:r>
-              <a:rPr lang="en-US" dirty="0" smtClean="0"/>
-              <a:t>Contents</a:t>
-            </a:r>
-            <a:r>
-              <a:rPr lang="en-US" dirty="0" smtClean="0"/>
-              <a:t>	</a:t>
-            </a:r>
-            <a:endParaRPr lang="en-US" dirty="0"/>
+              <a:rPr lang="en-US" dirty="0"/>
+              <a:t>Contents	</a:t>
+            </a:r>
           </a:p>
         </p:txBody>
       </p:sp>
@@ -3930,7 +3881,7 @@
         </p:spPr>
         <p:txBody>
           <a:bodyPr>
-            <a:normAutofit/>
+            <a:normAutofit lnSpcReduction="10000"/>
           </a:bodyPr>
           <a:lstStyle/>
           <a:p>
@@ -3939,20 +3890,8 @@
               <a:buAutoNum type="arabicPeriod"/>
             </a:pPr>
             <a:r>
-              <a:rPr lang="en-US" sz="2400" b="1" dirty="0" smtClean="0"/>
-              <a:t>Euclidean color </a:t>
-            </a:r>
-            <a:r>
               <a:rPr lang="en-US" sz="2400" b="1" dirty="0"/>
-              <a:t>f</a:t>
-            </a:r>
-            <a:r>
-              <a:rPr lang="en-US" sz="2400" b="1" dirty="0" smtClean="0"/>
-              <a:t>ilter </a:t>
-            </a:r>
-            <a:r>
-              <a:rPr lang="en-US" sz="2400" b="1" dirty="0" smtClean="0"/>
-              <a:t>overview</a:t>
+              <a:t>Euclidean color filter overview</a:t>
             </a:r>
           </a:p>
           <a:p>
@@ -3962,11 +3901,7 @@
             </a:pPr>
             <a:r>
               <a:rPr lang="en-US" sz="2000" dirty="0"/>
-              <a:t>	RGB-Colors and Euclidean </a:t>
-            </a:r>
-            <a:r>
-              <a:rPr lang="en-US" sz="2000" dirty="0" smtClean="0"/>
-              <a:t>distance</a:t>
+              <a:t>	RGB-Colors and Euclidean distance</a:t>
             </a:r>
           </a:p>
           <a:p>
@@ -3975,25 +3910,9 @@
               <a:buChar char="v"/>
             </a:pPr>
             <a:r>
-              <a:rPr lang="en-US" sz="2000" dirty="0" smtClean="0"/>
+              <a:rPr lang="en-US" sz="2000" dirty="0"/>
               <a:t> 	What does the Euclidean filter do?</a:t>
             </a:r>
-          </a:p>
-          <a:p>
-            <a:pPr marL="0" indent="0">
-              <a:buNone/>
-            </a:pPr>
-            <a:endParaRPr lang="en-US" dirty="0" smtClean="0"/>
-          </a:p>
-          <a:p>
-            <a:pPr marL="0" indent="0">
-              <a:buNone/>
-            </a:pPr>
-            <a:r>
-              <a:rPr lang="en-US" sz="2400" b="1" dirty="0" smtClean="0"/>
-              <a:t>2.   Architecture of the Project</a:t>
-            </a:r>
-            <a:endParaRPr lang="en-US" sz="2400" b="1" dirty="0" smtClean="0"/>
           </a:p>
           <a:p>
             <a:pPr marL="0" indent="0">
@@ -4006,16 +3925,45 @@
               <a:buNone/>
             </a:pPr>
             <a:r>
-              <a:rPr lang="en-US" sz="2400" b="1" dirty="0" smtClean="0"/>
-              <a:t>3.   Implementation</a:t>
-            </a:r>
-            <a:endParaRPr lang="en-US" sz="2400" b="1" dirty="0" smtClean="0"/>
+              <a:rPr lang="en-US" sz="2400" b="1" dirty="0"/>
+              <a:t>2.   Architecture of the Project</a:t>
+            </a:r>
           </a:p>
           <a:p>
             <a:pPr marL="0" indent="0">
               <a:buNone/>
             </a:pPr>
-            <a:endParaRPr lang="en-US" dirty="0" smtClean="0"/>
+            <a:endParaRPr lang="en-US" dirty="0"/>
+          </a:p>
+          <a:p>
+            <a:pPr marL="457200" indent="-457200">
+              <a:buAutoNum type="arabicPeriod" startAt="3"/>
+            </a:pPr>
+            <a:r>
+              <a:rPr lang="en-US" sz="2400" b="1" dirty="0"/>
+              <a:t>Implementation</a:t>
+            </a:r>
+          </a:p>
+          <a:p>
+            <a:pPr marL="457200" indent="-457200">
+              <a:buAutoNum type="arabicPeriod" startAt="3"/>
+            </a:pPr>
+            <a:endParaRPr lang="en-US" sz="2400" b="1" dirty="0"/>
+          </a:p>
+          <a:p>
+            <a:pPr marL="457200" indent="-457200">
+              <a:buAutoNum type="arabicPeriod" startAt="3"/>
+            </a:pPr>
+            <a:r>
+              <a:rPr lang="en-US" sz="2400" b="1" dirty="0"/>
+              <a:t>Tests</a:t>
+            </a:r>
+          </a:p>
+          <a:p>
+            <a:pPr marL="0" indent="0">
+              <a:buNone/>
+            </a:pPr>
+            <a:endParaRPr lang="en-US" dirty="0"/>
           </a:p>
         </p:txBody>
       </p:sp>
@@ -4082,13 +4030,6 @@
   <p:clrMapOvr>
     <a:masterClrMapping/>
   </p:clrMapOvr>
-  <p:timing>
-    <p:tnLst>
-      <p:par>
-        <p:cTn id="1" dur="indefinite" restart="never" nodeType="tmRoot"/>
-      </p:par>
-    </p:tnLst>
-  </p:timing>
 </p:sld>
 </file>
 
@@ -4133,22 +4074,14 @@
           <a:p>
             <a:r>
               <a:rPr lang="en-US" sz="4000" b="1" dirty="0"/>
-              <a:t>Euclidean color filter </a:t>
-            </a:r>
-            <a:r>
-              <a:rPr lang="en-US" sz="4000" b="1" dirty="0" smtClean="0"/>
-              <a:t>overview</a:t>
+              <a:t>Euclidean color filter overview</a:t>
             </a:r>
             <a:br>
-              <a:rPr lang="en-US" sz="4000" b="1" dirty="0" smtClean="0"/>
+              <a:rPr lang="en-US" sz="4000" b="1" dirty="0"/>
             </a:br>
             <a:r>
-              <a:rPr lang="en-US" sz="3200" dirty="0" smtClean="0"/>
-              <a:t>RGB-Colors </a:t>
-            </a:r>
-            <a:r>
               <a:rPr lang="en-US" sz="3200" dirty="0"/>
-              <a:t>and Euclidean distance</a:t>
+              <a:t>RGB-Colors and Euclidean distance</a:t>
             </a:r>
           </a:p>
         </p:txBody>
@@ -4206,8 +4139,8 @@
           </a:prstGeom>
         </p:spPr>
       </p:pic>
-      <mc:AlternateContent xmlns:mc="http://schemas.openxmlformats.org/markup-compatibility/2006">
-        <mc:Choice xmlns:a14="http://schemas.microsoft.com/office/drawing/2010/main" Requires="a14">
+      <mc:AlternateContent xmlns:mc="http://schemas.openxmlformats.org/markup-compatibility/2006" xmlns:a14="http://schemas.microsoft.com/office/drawing/2010/main">
+        <mc:Choice Requires="a14">
           <p:sp>
             <p:nvSpPr>
               <p:cNvPr id="6" name="Subtitle 2"/>
@@ -4399,88 +4332,88 @@
                   <a:buChar char="-"/>
                 </a:pPr>
                 <a:r>
-                  <a:rPr lang="de-DE" sz="2000" dirty="0" smtClean="0"/>
+                  <a:rPr lang="de-DE" sz="2000" dirty="0"/>
                   <a:t>RGB </a:t>
                 </a:r>
                 <a:r>
-                  <a:rPr lang="de-DE" sz="2000" dirty="0" err="1" smtClean="0"/>
+                  <a:rPr lang="de-DE" sz="2000" dirty="0" err="1"/>
                   <a:t>color</a:t>
                 </a:r>
                 <a:r>
-                  <a:rPr lang="de-DE" sz="2000" dirty="0" smtClean="0"/>
+                  <a:rPr lang="de-DE" sz="2000" dirty="0"/>
                   <a:t> </a:t>
                 </a:r>
                 <a:r>
-                  <a:rPr lang="de-DE" sz="2000" dirty="0" err="1" smtClean="0"/>
+                  <a:rPr lang="de-DE" sz="2000" dirty="0" err="1"/>
                   <a:t>space</a:t>
                 </a:r>
                 <a:r>
-                  <a:rPr lang="de-DE" sz="2000" dirty="0" smtClean="0"/>
+                  <a:rPr lang="de-DE" sz="2000" dirty="0"/>
                   <a:t> </a:t>
                 </a:r>
                 <a:r>
-                  <a:rPr lang="de-DE" sz="2000" dirty="0" smtClean="0">
+                  <a:rPr lang="de-DE" sz="2000" dirty="0">
                     <a:sym typeface="Wingdings" pitchFamily="2" charset="2"/>
                   </a:rPr>
                   <a:t></a:t>
                 </a:r>
                 <a:r>
-                  <a:rPr lang="de-DE" sz="2000" dirty="0" smtClean="0"/>
+                  <a:rPr lang="de-DE" sz="2000" dirty="0"/>
                   <a:t> </a:t>
                 </a:r>
                 <a:r>
-                  <a:rPr lang="de-DE" sz="2000" dirty="0" err="1" smtClean="0"/>
+                  <a:rPr lang="de-DE" sz="2000" dirty="0" err="1"/>
                   <a:t>mixed</a:t>
                 </a:r>
                 <a:r>
-                  <a:rPr lang="de-DE" sz="2000" dirty="0" smtClean="0"/>
+                  <a:rPr lang="de-DE" sz="2000" dirty="0"/>
                   <a:t> </a:t>
                 </a:r>
                 <a:r>
-                  <a:rPr lang="de-DE" sz="2000" dirty="0" err="1" smtClean="0"/>
+                  <a:rPr lang="de-DE" sz="2000" dirty="0" err="1"/>
                   <a:t>portions</a:t>
                 </a:r>
                 <a:r>
-                  <a:rPr lang="de-DE" sz="2000" dirty="0" smtClean="0"/>
+                  <a:rPr lang="de-DE" sz="2000" dirty="0"/>
                   <a:t> </a:t>
                 </a:r>
                 <a:r>
-                  <a:rPr lang="de-DE" sz="2000" dirty="0" err="1" smtClean="0"/>
+                  <a:rPr lang="de-DE" sz="2000" dirty="0" err="1"/>
                   <a:t>of</a:t>
                 </a:r>
                 <a:r>
-                  <a:rPr lang="de-DE" sz="2000" dirty="0" smtClean="0"/>
+                  <a:rPr lang="de-DE" sz="2000" dirty="0"/>
                   <a:t> </a:t>
                 </a:r>
                 <a:r>
-                  <a:rPr lang="de-DE" sz="2000" dirty="0" err="1" smtClean="0"/>
+                  <a:rPr lang="de-DE" sz="2000" dirty="0" err="1"/>
                   <a:t>red</a:t>
                 </a:r>
                 <a:r>
-                  <a:rPr lang="de-DE" sz="2000" dirty="0" smtClean="0"/>
+                  <a:rPr lang="de-DE" sz="2000" dirty="0"/>
                   <a:t>, </a:t>
                 </a:r>
                 <a:r>
-                  <a:rPr lang="de-DE" sz="2000" dirty="0" err="1" smtClean="0"/>
+                  <a:rPr lang="de-DE" sz="2000" dirty="0" err="1"/>
                   <a:t>green</a:t>
                 </a:r>
                 <a:r>
-                  <a:rPr lang="de-DE" sz="2000" dirty="0" smtClean="0"/>
+                  <a:rPr lang="de-DE" sz="2000" dirty="0"/>
                   <a:t> </a:t>
                 </a:r>
                 <a:r>
-                  <a:rPr lang="de-DE" sz="2000" dirty="0" err="1" smtClean="0"/>
+                  <a:rPr lang="de-DE" sz="2000" dirty="0" err="1"/>
                   <a:t>and</a:t>
                 </a:r>
                 <a:r>
-                  <a:rPr lang="de-DE" sz="2000" dirty="0" smtClean="0"/>
+                  <a:rPr lang="de-DE" sz="2000" dirty="0"/>
                   <a:t> </a:t>
                 </a:r>
                 <a:r>
-                  <a:rPr lang="de-DE" sz="2000" dirty="0" err="1" smtClean="0"/>
+                  <a:rPr lang="de-DE" sz="2000" dirty="0" err="1"/>
                   <a:t>blue</a:t>
                 </a:r>
-                <a:endParaRPr lang="de-DE" sz="2000" dirty="0" smtClean="0"/>
+                <a:endParaRPr lang="de-DE" sz="2000" dirty="0"/>
               </a:p>
               <a:p>
                 <a:pPr>
@@ -4488,31 +4421,31 @@
                   <a:buChar char="-"/>
                 </a:pPr>
                 <a:r>
-                  <a:rPr lang="de-DE" sz="2000" dirty="0" smtClean="0"/>
+                  <a:rPr lang="de-DE" sz="2000" dirty="0"/>
                   <a:t>The RGB </a:t>
                 </a:r>
                 <a:r>
-                  <a:rPr lang="de-DE" sz="2000" dirty="0" err="1" smtClean="0"/>
+                  <a:rPr lang="de-DE" sz="2000" dirty="0" err="1"/>
                   <a:t>value</a:t>
                 </a:r>
                 <a:r>
-                  <a:rPr lang="de-DE" sz="2000" dirty="0" smtClean="0"/>
+                  <a:rPr lang="de-DE" sz="2000" dirty="0"/>
                   <a:t> </a:t>
                 </a:r>
                 <a:r>
-                  <a:rPr lang="de-DE" sz="2000" dirty="0" err="1" smtClean="0"/>
+                  <a:rPr lang="de-DE" sz="2000" dirty="0" err="1"/>
                   <a:t>is</a:t>
                 </a:r>
                 <a:r>
-                  <a:rPr lang="de-DE" sz="2000" dirty="0" smtClean="0"/>
+                  <a:rPr lang="de-DE" sz="2000" dirty="0"/>
                   <a:t> </a:t>
                 </a:r>
                 <a:r>
-                  <a:rPr lang="de-DE" sz="2000" dirty="0" err="1" smtClean="0"/>
+                  <a:rPr lang="de-DE" sz="2000" dirty="0" err="1"/>
                   <a:t>represented</a:t>
                 </a:r>
                 <a:r>
-                  <a:rPr lang="de-DE" sz="2000" dirty="0" smtClean="0"/>
+                  <a:rPr lang="de-DE" sz="2000" dirty="0"/>
                   <a:t> 3 dimensional</a:t>
                 </a:r>
               </a:p>
@@ -4522,54 +4455,54 @@
                   <a:buChar char="-"/>
                 </a:pPr>
                 <a:r>
-                  <a:rPr lang="de-DE" sz="2000" dirty="0" smtClean="0"/>
+                  <a:rPr lang="de-DE" sz="2000" dirty="0"/>
                   <a:t>VS </a:t>
                 </a:r>
                 <a:r>
-                  <a:rPr lang="de-DE" sz="2000" dirty="0" err="1" smtClean="0"/>
+                  <a:rPr lang="de-DE" sz="2000" dirty="0" err="1"/>
                   <a:t>use</a:t>
                 </a:r>
                 <a:r>
-                  <a:rPr lang="de-DE" sz="2000" dirty="0" smtClean="0"/>
+                  <a:rPr lang="de-DE" sz="2000" dirty="0"/>
                   <a:t> 8 </a:t>
                 </a:r>
                 <a:r>
-                  <a:rPr lang="de-DE" sz="2000" dirty="0" err="1" smtClean="0"/>
+                  <a:rPr lang="de-DE" sz="2000" dirty="0" err="1"/>
                   <a:t>bits</a:t>
                 </a:r>
                 <a:r>
-                  <a:rPr lang="de-DE" sz="2000" dirty="0" smtClean="0"/>
+                  <a:rPr lang="de-DE" sz="2000" dirty="0"/>
                   <a:t> per </a:t>
                 </a:r>
                 <a:r>
-                  <a:rPr lang="de-DE" sz="2000" dirty="0" err="1" smtClean="0"/>
+                  <a:rPr lang="de-DE" sz="2000" dirty="0" err="1"/>
                   <a:t>color</a:t>
                 </a:r>
                 <a:r>
-                  <a:rPr lang="de-DE" sz="2000" dirty="0" smtClean="0"/>
+                  <a:rPr lang="de-DE" sz="2000" dirty="0"/>
                   <a:t> </a:t>
                 </a:r>
                 <a:r>
-                  <a:rPr lang="de-DE" sz="2000" dirty="0" err="1" smtClean="0"/>
+                  <a:rPr lang="de-DE" sz="2000" dirty="0" err="1"/>
                   <a:t>channel</a:t>
                 </a:r>
                 <a:r>
-                  <a:rPr lang="de-DE" sz="2000" dirty="0" smtClean="0"/>
+                  <a:rPr lang="de-DE" sz="2000" dirty="0"/>
                   <a:t> </a:t>
                 </a:r>
                 <a:r>
-                  <a:rPr lang="de-DE" sz="2000" dirty="0" err="1" smtClean="0"/>
+                  <a:rPr lang="de-DE" sz="2000" dirty="0" err="1"/>
                   <a:t>by</a:t>
                 </a:r>
                 <a:r>
-                  <a:rPr lang="de-DE" sz="2000" dirty="0" smtClean="0"/>
+                  <a:rPr lang="de-DE" sz="2000" dirty="0"/>
                   <a:t> </a:t>
                 </a:r>
                 <a:r>
-                  <a:rPr lang="de-DE" sz="2000" dirty="0" err="1" smtClean="0"/>
+                  <a:rPr lang="de-DE" sz="2000" dirty="0" err="1"/>
                   <a:t>default</a:t>
                 </a:r>
-                <a:endParaRPr lang="de-DE" sz="2000" dirty="0" smtClean="0"/>
+                <a:endParaRPr lang="de-DE" sz="2000" dirty="0"/>
               </a:p>
               <a:p>
                 <a:pPr>
@@ -4581,18 +4514,24 @@
                     <m:sSup>
                       <m:sSupPr>
                         <m:ctrlPr>
-                          <a:rPr lang="de-DE" sz="2000" i="1"/>
+                          <a:rPr lang="de-DE" sz="2000" i="1">
+                            <a:latin typeface="Cambria Math" panose="02040503050406030204" pitchFamily="18" charset="0"/>
+                          </a:rPr>
                         </m:ctrlPr>
                       </m:sSupPr>
                       <m:e>
                         <m:r>
-                          <a:rPr lang="en-US" sz="2000" i="1"/>
+                          <a:rPr lang="en-US" sz="2000" i="1">
+                            <a:latin typeface="Cambria Math" panose="02040503050406030204" pitchFamily="18" charset="0"/>
+                          </a:rPr>
                           <m:t>2</m:t>
                         </m:r>
                       </m:e>
                       <m:sup>
                         <m:r>
-                          <a:rPr lang="en-US" sz="2000" i="1"/>
+                          <a:rPr lang="en-US" sz="2000" i="1">
+                            <a:latin typeface="Cambria Math" panose="02040503050406030204" pitchFamily="18" charset="0"/>
+                          </a:rPr>
                           <m:t>8</m:t>
                         </m:r>
                       </m:sup>
@@ -4601,14 +4540,10 @@
                 </a14:m>
                 <a:r>
                   <a:rPr lang="en-US" sz="2000" dirty="0"/>
-                  <a:t> </a:t>
+                  <a:t> bit </a:t>
                 </a:r>
                 <a:r>
-                  <a:rPr lang="en-US" sz="2000" dirty="0" smtClean="0"/>
-                  <a:t>bit </a:t>
-                </a:r>
-                <a:r>
-                  <a:rPr lang="en-US" sz="2000" dirty="0" smtClean="0">
+                  <a:rPr lang="en-US" sz="2000" dirty="0">
                     <a:sym typeface="Wingdings" pitchFamily="2" charset="2"/>
                   </a:rPr>
                   <a:t> each value ranges from 0 .. 255  </a:t>
@@ -4620,7 +4555,7 @@
                   <a:buChar char="-"/>
                 </a:pPr>
                 <a:r>
-                  <a:rPr lang="en-US" sz="2000" dirty="0" smtClean="0">
+                  <a:rPr lang="en-US" sz="2000" dirty="0">
                     <a:sym typeface="Wingdings" pitchFamily="2" charset="2"/>
                   </a:rPr>
                   <a:t>White  255,255,255; Black  0,0,0</a:t>
@@ -4640,7 +4575,7 @@
                   <a:buChar char="-"/>
                 </a:pPr>
                 <a:r>
-                  <a:rPr lang="en-US" sz="2000" dirty="0" smtClean="0">
+                  <a:rPr lang="en-US" sz="2000" dirty="0">
                     <a:sym typeface="Wingdings" pitchFamily="2" charset="2"/>
                   </a:rPr>
                   <a:t>Euclidean distance describes the distance between two Points </a:t>
@@ -4652,7 +4587,7 @@
                   <a:buChar char="-"/>
                 </a:pPr>
                 <a:r>
-                  <a:rPr lang="en-US" sz="2000" dirty="0" smtClean="0">
+                  <a:rPr lang="en-US" sz="2000" dirty="0">
                     <a:sym typeface="Wingdings" pitchFamily="2" charset="2"/>
                   </a:rPr>
                   <a:t>Since the RGB-values are 3 dimensional </a:t>
@@ -4669,34 +4604,48 @@
                     </m:oMathParaPr>
                     <m:oMath xmlns:m="http://schemas.openxmlformats.org/officeDocument/2006/math">
                       <m:r>
-                        <a:rPr lang="de-DE" sz="1600" i="1"/>
+                        <a:rPr lang="de-DE" sz="1600" i="1">
+                          <a:latin typeface="Cambria Math" panose="02040503050406030204" pitchFamily="18" charset="0"/>
+                        </a:rPr>
                         <m:t>𝑑</m:t>
                       </m:r>
                       <m:r>
-                        <a:rPr lang="en-US" sz="1600" i="1"/>
+                        <a:rPr lang="en-US" sz="1600" i="1">
+                          <a:latin typeface="Cambria Math" panose="02040503050406030204" pitchFamily="18" charset="0"/>
+                        </a:rPr>
                         <m:t>(</m:t>
                       </m:r>
                       <m:r>
-                        <a:rPr lang="de-DE" sz="1600" i="1"/>
+                        <a:rPr lang="de-DE" sz="1600" i="1">
+                          <a:latin typeface="Cambria Math" panose="02040503050406030204" pitchFamily="18" charset="0"/>
+                        </a:rPr>
                         <m:t>𝑝</m:t>
                       </m:r>
                       <m:r>
-                        <a:rPr lang="en-US" sz="1600" i="1"/>
+                        <a:rPr lang="en-US" sz="1600" i="1">
+                          <a:latin typeface="Cambria Math" panose="02040503050406030204" pitchFamily="18" charset="0"/>
+                        </a:rPr>
                         <m:t>,</m:t>
                       </m:r>
                       <m:r>
-                        <a:rPr lang="de-DE" sz="1600" i="1"/>
+                        <a:rPr lang="de-DE" sz="1600" i="1">
+                          <a:latin typeface="Cambria Math" panose="02040503050406030204" pitchFamily="18" charset="0"/>
+                        </a:rPr>
                         <m:t>𝑞</m:t>
                       </m:r>
                       <m:r>
-                        <a:rPr lang="en-US" sz="1600" i="1"/>
+                        <a:rPr lang="en-US" sz="1600" i="1">
+                          <a:latin typeface="Cambria Math" panose="02040503050406030204" pitchFamily="18" charset="0"/>
+                        </a:rPr>
                         <m:t>)= </m:t>
                       </m:r>
                       <m:rad>
                         <m:radPr>
                           <m:degHide m:val="on"/>
                           <m:ctrlPr>
-                            <a:rPr lang="de-DE" sz="1600" i="1"/>
+                            <a:rPr lang="de-DE" sz="1600" i="1">
+                              <a:latin typeface="Cambria Math" panose="02040503050406030204" pitchFamily="18" charset="0"/>
+                            </a:rPr>
                           </m:ctrlPr>
                         </m:radPr>
                         <m:deg/>
@@ -4704,55 +4653,73 @@
                           <m:sSup>
                             <m:sSupPr>
                               <m:ctrlPr>
-                                <a:rPr lang="de-DE" sz="1600" i="1"/>
+                                <a:rPr lang="de-DE" sz="1600" i="1">
+                                  <a:latin typeface="Cambria Math" panose="02040503050406030204" pitchFamily="18" charset="0"/>
+                                </a:rPr>
                               </m:ctrlPr>
                             </m:sSupPr>
                             <m:e>
                               <m:d>
                                 <m:dPr>
                                   <m:ctrlPr>
-                                    <a:rPr lang="de-DE" sz="1600" i="1"/>
+                                    <a:rPr lang="de-DE" sz="1600" i="1">
+                                      <a:latin typeface="Cambria Math" panose="02040503050406030204" pitchFamily="18" charset="0"/>
+                                    </a:rPr>
                                   </m:ctrlPr>
                                 </m:dPr>
                                 <m:e>
                                   <m:sSub>
                                     <m:sSubPr>
                                       <m:ctrlPr>
-                                        <a:rPr lang="de-DE" sz="1600" i="1"/>
+                                        <a:rPr lang="de-DE" sz="1600" i="1">
+                                          <a:latin typeface="Cambria Math" panose="02040503050406030204" pitchFamily="18" charset="0"/>
+                                        </a:rPr>
                                       </m:ctrlPr>
                                     </m:sSubPr>
                                     <m:e>
                                       <m:r>
-                                        <a:rPr lang="de-DE" sz="1600" i="1"/>
+                                        <a:rPr lang="de-DE" sz="1600" i="1">
+                                          <a:latin typeface="Cambria Math" panose="02040503050406030204" pitchFamily="18" charset="0"/>
+                                        </a:rPr>
                                         <m:t>𝑞</m:t>
                                       </m:r>
                                     </m:e>
                                     <m:sub>
                                       <m:r>
-                                        <a:rPr lang="en-US" sz="1600" i="1"/>
+                                        <a:rPr lang="en-US" sz="1600" i="1">
+                                          <a:latin typeface="Cambria Math" panose="02040503050406030204" pitchFamily="18" charset="0"/>
+                                        </a:rPr>
                                         <m:t>1</m:t>
                                       </m:r>
                                     </m:sub>
                                   </m:sSub>
                                   <m:r>
-                                    <a:rPr lang="en-US" sz="1600" i="1"/>
+                                    <a:rPr lang="en-US" sz="1600" i="1">
+                                      <a:latin typeface="Cambria Math" panose="02040503050406030204" pitchFamily="18" charset="0"/>
+                                    </a:rPr>
                                     <m:t>−</m:t>
                                   </m:r>
                                   <m:sSub>
                                     <m:sSubPr>
                                       <m:ctrlPr>
-                                        <a:rPr lang="de-DE" sz="1600" i="1"/>
+                                        <a:rPr lang="de-DE" sz="1600" i="1">
+                                          <a:latin typeface="Cambria Math" panose="02040503050406030204" pitchFamily="18" charset="0"/>
+                                        </a:rPr>
                                       </m:ctrlPr>
                                     </m:sSubPr>
                                     <m:e>
                                       <m:r>
-                                        <a:rPr lang="de-DE" sz="1600" i="1"/>
+                                        <a:rPr lang="de-DE" sz="1600" i="1">
+                                          <a:latin typeface="Cambria Math" panose="02040503050406030204" pitchFamily="18" charset="0"/>
+                                        </a:rPr>
                                         <m:t>𝑝</m:t>
                                       </m:r>
                                     </m:e>
                                     <m:sub>
                                       <m:r>
-                                        <a:rPr lang="en-US" sz="1600" i="1"/>
+                                        <a:rPr lang="en-US" sz="1600" i="1">
+                                          <a:latin typeface="Cambria Math" panose="02040503050406030204" pitchFamily="18" charset="0"/>
+                                        </a:rPr>
                                         <m:t>1</m:t>
                                       </m:r>
                                     </m:sub>
@@ -4762,67 +4729,89 @@
                             </m:e>
                             <m:sup>
                               <m:r>
-                                <a:rPr lang="en-US" sz="1600" i="1"/>
+                                <a:rPr lang="en-US" sz="1600" i="1">
+                                  <a:latin typeface="Cambria Math" panose="02040503050406030204" pitchFamily="18" charset="0"/>
+                                </a:rPr>
                                 <m:t>2</m:t>
                               </m:r>
                             </m:sup>
                           </m:sSup>
                           <m:r>
-                            <a:rPr lang="en-US" sz="1600" i="1"/>
+                            <a:rPr lang="en-US" sz="1600" i="1">
+                              <a:latin typeface="Cambria Math" panose="02040503050406030204" pitchFamily="18" charset="0"/>
+                            </a:rPr>
                             <m:t>+ </m:t>
                           </m:r>
                           <m:sSup>
                             <m:sSupPr>
                               <m:ctrlPr>
-                                <a:rPr lang="de-DE" sz="1600" i="1"/>
+                                <a:rPr lang="de-DE" sz="1600" i="1">
+                                  <a:latin typeface="Cambria Math" panose="02040503050406030204" pitchFamily="18" charset="0"/>
+                                </a:rPr>
                               </m:ctrlPr>
                             </m:sSupPr>
                             <m:e>
                               <m:d>
                                 <m:dPr>
                                   <m:ctrlPr>
-                                    <a:rPr lang="de-DE" sz="1600" i="1"/>
+                                    <a:rPr lang="de-DE" sz="1600" i="1">
+                                      <a:latin typeface="Cambria Math" panose="02040503050406030204" pitchFamily="18" charset="0"/>
+                                    </a:rPr>
                                   </m:ctrlPr>
                                 </m:dPr>
                                 <m:e>
                                   <m:sSub>
                                     <m:sSubPr>
                                       <m:ctrlPr>
-                                        <a:rPr lang="de-DE" sz="1600" i="1"/>
+                                        <a:rPr lang="de-DE" sz="1600" i="1">
+                                          <a:latin typeface="Cambria Math" panose="02040503050406030204" pitchFamily="18" charset="0"/>
+                                        </a:rPr>
                                       </m:ctrlPr>
                                     </m:sSubPr>
                                     <m:e>
                                       <m:r>
-                                        <a:rPr lang="de-DE" sz="1600" i="1"/>
+                                        <a:rPr lang="de-DE" sz="1600" i="1">
+                                          <a:latin typeface="Cambria Math" panose="02040503050406030204" pitchFamily="18" charset="0"/>
+                                        </a:rPr>
                                         <m:t>𝑞</m:t>
                                       </m:r>
                                     </m:e>
                                     <m:sub>
                                       <m:r>
-                                        <a:rPr lang="en-US" sz="1600" i="1"/>
+                                        <a:rPr lang="en-US" sz="1600" i="1">
+                                          <a:latin typeface="Cambria Math" panose="02040503050406030204" pitchFamily="18" charset="0"/>
+                                        </a:rPr>
                                         <m:t>2</m:t>
                                       </m:r>
                                     </m:sub>
                                   </m:sSub>
                                   <m:r>
-                                    <a:rPr lang="en-US" sz="1600" i="1"/>
+                                    <a:rPr lang="en-US" sz="1600" i="1">
+                                      <a:latin typeface="Cambria Math" panose="02040503050406030204" pitchFamily="18" charset="0"/>
+                                    </a:rPr>
                                     <m:t>−</m:t>
                                   </m:r>
                                   <m:sSub>
                                     <m:sSubPr>
                                       <m:ctrlPr>
-                                        <a:rPr lang="de-DE" sz="1600" i="1"/>
+                                        <a:rPr lang="de-DE" sz="1600" i="1">
+                                          <a:latin typeface="Cambria Math" panose="02040503050406030204" pitchFamily="18" charset="0"/>
+                                        </a:rPr>
                                       </m:ctrlPr>
                                     </m:sSubPr>
                                     <m:e>
                                       <m:r>
-                                        <a:rPr lang="de-DE" sz="1600" i="1"/>
+                                        <a:rPr lang="de-DE" sz="1600" i="1">
+                                          <a:latin typeface="Cambria Math" panose="02040503050406030204" pitchFamily="18" charset="0"/>
+                                        </a:rPr>
                                         <m:t>𝑝</m:t>
                                       </m:r>
                                     </m:e>
                                     <m:sub>
                                       <m:r>
-                                        <a:rPr lang="en-US" sz="1600" i="1"/>
+                                        <a:rPr lang="en-US" sz="1600" i="1">
+                                          <a:latin typeface="Cambria Math" panose="02040503050406030204" pitchFamily="18" charset="0"/>
+                                        </a:rPr>
                                         <m:t>2</m:t>
                                       </m:r>
                                     </m:sub>
@@ -4832,59 +4821,79 @@
                             </m:e>
                             <m:sup>
                               <m:r>
-                                <a:rPr lang="en-US" sz="1600" i="1"/>
+                                <a:rPr lang="en-US" sz="1600" i="1">
+                                  <a:latin typeface="Cambria Math" panose="02040503050406030204" pitchFamily="18" charset="0"/>
+                                </a:rPr>
                                 <m:t>2</m:t>
                               </m:r>
                             </m:sup>
                           </m:sSup>
                           <m:r>
-                            <a:rPr lang="en-US" sz="1600" i="1"/>
+                            <a:rPr lang="en-US" sz="1600" i="1">
+                              <a:latin typeface="Cambria Math" panose="02040503050406030204" pitchFamily="18" charset="0"/>
+                            </a:rPr>
                             <m:t>+(</m:t>
                           </m:r>
                           <m:sSub>
                             <m:sSubPr>
                               <m:ctrlPr>
-                                <a:rPr lang="de-DE" sz="1600" i="1"/>
+                                <a:rPr lang="de-DE" sz="1600" i="1">
+                                  <a:latin typeface="Cambria Math" panose="02040503050406030204" pitchFamily="18" charset="0"/>
+                                </a:rPr>
                               </m:ctrlPr>
                             </m:sSubPr>
                             <m:e>
                               <m:r>
-                                <a:rPr lang="de-DE" sz="1600" i="1"/>
+                                <a:rPr lang="de-DE" sz="1600" i="1">
+                                  <a:latin typeface="Cambria Math" panose="02040503050406030204" pitchFamily="18" charset="0"/>
+                                </a:rPr>
                                 <m:t>𝑞</m:t>
                               </m:r>
                             </m:e>
                             <m:sub>
                               <m:r>
-                                <a:rPr lang="en-US" sz="1600" i="1"/>
+                                <a:rPr lang="en-US" sz="1600" i="1">
+                                  <a:latin typeface="Cambria Math" panose="02040503050406030204" pitchFamily="18" charset="0"/>
+                                </a:rPr>
                                 <m:t>3</m:t>
                               </m:r>
                             </m:sub>
                           </m:sSub>
                           <m:r>
-                            <a:rPr lang="en-US" sz="1600" i="1"/>
+                            <a:rPr lang="en-US" sz="1600" i="1">
+                              <a:latin typeface="Cambria Math" panose="02040503050406030204" pitchFamily="18" charset="0"/>
+                            </a:rPr>
                             <m:t>− </m:t>
                           </m:r>
                           <m:sSub>
                             <m:sSubPr>
                               <m:ctrlPr>
-                                <a:rPr lang="de-DE" sz="1600" i="1"/>
+                                <a:rPr lang="de-DE" sz="1600" i="1">
+                                  <a:latin typeface="Cambria Math" panose="02040503050406030204" pitchFamily="18" charset="0"/>
+                                </a:rPr>
                               </m:ctrlPr>
                             </m:sSubPr>
                             <m:e>
                               <m:r>
-                                <a:rPr lang="de-DE" sz="1600" i="1"/>
+                                <a:rPr lang="de-DE" sz="1600" i="1">
+                                  <a:latin typeface="Cambria Math" panose="02040503050406030204" pitchFamily="18" charset="0"/>
+                                </a:rPr>
                                 <m:t>𝑝</m:t>
                               </m:r>
                             </m:e>
                             <m:sub>
                               <m:r>
-                                <a:rPr lang="en-US" sz="1600" i="1"/>
+                                <a:rPr lang="en-US" sz="1600" i="1">
+                                  <a:latin typeface="Cambria Math" panose="02040503050406030204" pitchFamily="18" charset="0"/>
+                                </a:rPr>
                                 <m:t>3</m:t>
                               </m:r>
                             </m:sub>
                           </m:sSub>
                           <m:r>
-                            <a:rPr lang="en-US" sz="1600" i="1"/>
+                            <a:rPr lang="en-US" sz="1600" i="1">
+                              <a:latin typeface="Cambria Math" panose="02040503050406030204" pitchFamily="18" charset="0"/>
+                            </a:rPr>
                             <m:t>)²</m:t>
                           </m:r>
                         </m:e>
@@ -4892,7 +4901,7 @@
                     </m:oMath>
                   </m:oMathPara>
                 </a14:m>
-                <a:endParaRPr lang="en-US" sz="2000" dirty="0" smtClean="0">
+                <a:endParaRPr lang="en-US" sz="2000" dirty="0">
                   <a:sym typeface="Wingdings" pitchFamily="2" charset="2"/>
                 </a:endParaRPr>
               </a:p>
@@ -4902,7 +4911,7 @@
                   <a:buChar char="-"/>
                 </a:pPr>
                 <a:r>
-                  <a:rPr lang="en-US" sz="2000" dirty="0" smtClean="0">
+                  <a:rPr lang="en-US" sz="2000" dirty="0">
                     <a:sym typeface="Wingdings" pitchFamily="2" charset="2"/>
                   </a:rPr>
                   <a:t>Example:  </a:t>
@@ -4910,18 +4919,24 @@
                 <a14:m>
                   <m:oMath xmlns:m="http://schemas.openxmlformats.org/officeDocument/2006/math">
                     <m:r>
-                      <a:rPr lang="de-DE" sz="1800" i="1"/>
+                      <a:rPr lang="de-DE" sz="1800" i="1">
+                        <a:latin typeface="Cambria Math" panose="02040503050406030204" pitchFamily="18" charset="0"/>
+                      </a:rPr>
                       <m:t>𝑑</m:t>
                     </m:r>
                     <m:r>
-                      <a:rPr lang="en-US" sz="1800" i="1"/>
+                      <a:rPr lang="en-US" sz="1800" i="1">
+                        <a:latin typeface="Cambria Math" panose="02040503050406030204" pitchFamily="18" charset="0"/>
+                      </a:rPr>
                       <m:t>= </m:t>
                     </m:r>
                     <m:rad>
                       <m:radPr>
                         <m:degHide m:val="on"/>
                         <m:ctrlPr>
-                          <a:rPr lang="de-DE" sz="1800" i="1"/>
+                          <a:rPr lang="de-DE" sz="1800" i="1">
+                            <a:latin typeface="Cambria Math" panose="02040503050406030204" pitchFamily="18" charset="0"/>
+                          </a:rPr>
                         </m:ctrlPr>
                       </m:radPr>
                       <m:deg/>
@@ -4929,19 +4944,25 @@
                         <m:sSup>
                           <m:sSupPr>
                             <m:ctrlPr>
-                              <a:rPr lang="de-DE" sz="1800" i="1"/>
+                              <a:rPr lang="de-DE" sz="1800" i="1">
+                                <a:latin typeface="Cambria Math" panose="02040503050406030204" pitchFamily="18" charset="0"/>
+                              </a:rPr>
                             </m:ctrlPr>
                           </m:sSupPr>
                           <m:e>
                             <m:d>
                               <m:dPr>
                                 <m:ctrlPr>
-                                  <a:rPr lang="de-DE" sz="1800" i="1"/>
+                                  <a:rPr lang="de-DE" sz="1800" i="1">
+                                    <a:latin typeface="Cambria Math" panose="02040503050406030204" pitchFamily="18" charset="0"/>
+                                  </a:rPr>
                                 </m:ctrlPr>
                               </m:dPr>
                               <m:e>
                                 <m:r>
-                                  <a:rPr lang="de-DE" sz="1800" i="1"/>
+                                  <a:rPr lang="de-DE" sz="1800" i="1">
+                                    <a:latin typeface="Cambria Math" panose="02040503050406030204" pitchFamily="18" charset="0"/>
+                                  </a:rPr>
                                   <m:t>101−220</m:t>
                                 </m:r>
                               </m:e>
@@ -4949,31 +4970,41 @@
                           </m:e>
                           <m:sup>
                             <m:r>
-                              <a:rPr lang="en-US" sz="1800" i="1"/>
+                              <a:rPr lang="en-US" sz="1800" i="1">
+                                <a:latin typeface="Cambria Math" panose="02040503050406030204" pitchFamily="18" charset="0"/>
+                              </a:rPr>
                               <m:t>2</m:t>
                             </m:r>
                           </m:sup>
                         </m:sSup>
                         <m:r>
-                          <a:rPr lang="en-US" sz="1800" i="1"/>
+                          <a:rPr lang="en-US" sz="1800" i="1">
+                            <a:latin typeface="Cambria Math" panose="02040503050406030204" pitchFamily="18" charset="0"/>
+                          </a:rPr>
                           <m:t>+</m:t>
                         </m:r>
                         <m:sSup>
                           <m:sSupPr>
                             <m:ctrlPr>
-                              <a:rPr lang="de-DE" sz="1800" i="1"/>
+                              <a:rPr lang="de-DE" sz="1800" i="1">
+                                <a:latin typeface="Cambria Math" panose="02040503050406030204" pitchFamily="18" charset="0"/>
+                              </a:rPr>
                             </m:ctrlPr>
                           </m:sSupPr>
                           <m:e>
                             <m:d>
                               <m:dPr>
                                 <m:ctrlPr>
-                                  <a:rPr lang="de-DE" sz="1800" i="1"/>
+                                  <a:rPr lang="de-DE" sz="1800" i="1">
+                                    <a:latin typeface="Cambria Math" panose="02040503050406030204" pitchFamily="18" charset="0"/>
+                                  </a:rPr>
                                 </m:ctrlPr>
                               </m:dPr>
                               <m:e>
                                 <m:r>
-                                  <a:rPr lang="de-DE" sz="1800" i="1"/>
+                                  <a:rPr lang="de-DE" sz="1800" i="1">
+                                    <a:latin typeface="Cambria Math" panose="02040503050406030204" pitchFamily="18" charset="0"/>
+                                  </a:rPr>
                                   <m:t>90−200</m:t>
                                 </m:r>
                               </m:e>
@@ -4981,31 +5012,41 @@
                           </m:e>
                           <m:sup>
                             <m:r>
-                              <a:rPr lang="en-US" sz="1800" i="1"/>
+                              <a:rPr lang="en-US" sz="1800" i="1">
+                                <a:latin typeface="Cambria Math" panose="02040503050406030204" pitchFamily="18" charset="0"/>
+                              </a:rPr>
                               <m:t>2</m:t>
                             </m:r>
                           </m:sup>
                         </m:sSup>
                         <m:r>
-                          <a:rPr lang="en-US" sz="1800" i="1"/>
+                          <a:rPr lang="en-US" sz="1800" i="1">
+                            <a:latin typeface="Cambria Math" panose="02040503050406030204" pitchFamily="18" charset="0"/>
+                          </a:rPr>
                           <m:t>+</m:t>
                         </m:r>
                         <m:sSup>
                           <m:sSupPr>
                             <m:ctrlPr>
-                              <a:rPr lang="de-DE" sz="1800" i="1"/>
+                              <a:rPr lang="de-DE" sz="1800" i="1">
+                                <a:latin typeface="Cambria Math" panose="02040503050406030204" pitchFamily="18" charset="0"/>
+                              </a:rPr>
                             </m:ctrlPr>
                           </m:sSupPr>
                           <m:e>
                             <m:d>
                               <m:dPr>
                                 <m:ctrlPr>
-                                  <a:rPr lang="de-DE" sz="1800" i="1"/>
+                                  <a:rPr lang="de-DE" sz="1800" i="1">
+                                    <a:latin typeface="Cambria Math" panose="02040503050406030204" pitchFamily="18" charset="0"/>
+                                  </a:rPr>
                                 </m:ctrlPr>
                               </m:dPr>
                               <m:e>
                                 <m:r>
-                                  <a:rPr lang="de-DE" sz="1800" i="1"/>
+                                  <a:rPr lang="de-DE" sz="1800" i="1">
+                                    <a:latin typeface="Cambria Math" panose="02040503050406030204" pitchFamily="18" charset="0"/>
+                                  </a:rPr>
                                   <m:t>58−51</m:t>
                                 </m:r>
                               </m:e>
@@ -5013,7 +5054,9 @@
                           </m:e>
                           <m:sup>
                             <m:r>
-                              <a:rPr lang="en-US" sz="1800" i="1"/>
+                              <a:rPr lang="en-US" sz="1800" i="1">
+                                <a:latin typeface="Cambria Math" panose="02040503050406030204" pitchFamily="18" charset="0"/>
+                              </a:rPr>
                               <m:t>2</m:t>
                             </m:r>
                           </m:sup>
@@ -5021,11 +5064,15 @@
                       </m:e>
                     </m:rad>
                     <m:r>
-                      <a:rPr lang="de-DE" sz="1800" i="1"/>
+                      <a:rPr lang="de-DE" sz="1800" i="1">
+                        <a:latin typeface="Cambria Math" panose="02040503050406030204" pitchFamily="18" charset="0"/>
+                      </a:rPr>
                       <m:t>= </m:t>
                     </m:r>
                     <m:r>
-                      <a:rPr lang="en-US" sz="1800" i="1"/>
+                      <a:rPr lang="en-US" sz="1800" i="1">
+                        <a:latin typeface="Cambria Math" panose="02040503050406030204" pitchFamily="18" charset="0"/>
+                      </a:rPr>
                       <m:t>162,2</m:t>
                     </m:r>
                   </m:oMath>
@@ -5039,19 +5086,19 @@
                   <a:buNone/>
                 </a:pPr>
                 <a:r>
-                  <a:rPr lang="en-US" sz="2000" dirty="0" smtClean="0">
+                  <a:rPr lang="en-US" sz="2000" dirty="0">
                     <a:sym typeface="Wingdings" pitchFamily="2" charset="2"/>
                   </a:rPr>
                   <a:t>-</a:t>
                 </a:r>
                 <a:r>
-                  <a:rPr lang="de-DE" sz="2000" dirty="0" smtClean="0">
+                  <a:rPr lang="de-DE" sz="2000" dirty="0">
                     <a:sym typeface="Wingdings" pitchFamily="2" charset="2"/>
                   </a:rPr>
                   <a:t>   Special </a:t>
                 </a:r>
                 <a:r>
-                  <a:rPr lang="de-DE" sz="2000" dirty="0" err="1" smtClean="0">
+                  <a:rPr lang="de-DE" sz="2000" dirty="0" err="1">
                     <a:sym typeface="Wingdings" pitchFamily="2" charset="2"/>
                   </a:rPr>
                   <a:t>cases</a:t>
@@ -5063,31 +5110,31 @@
                   <a:t> </a:t>
                 </a:r>
                 <a:r>
-                  <a:rPr lang="de-DE" sz="2000" dirty="0" err="1" smtClean="0">
+                  <a:rPr lang="de-DE" sz="2000" dirty="0" err="1">
                     <a:sym typeface="Wingdings" pitchFamily="2" charset="2"/>
                   </a:rPr>
                   <a:t>of</a:t>
                 </a:r>
                 <a:r>
-                  <a:rPr lang="de-DE" sz="2000" dirty="0" smtClean="0">
+                  <a:rPr lang="de-DE" sz="2000" dirty="0">
                     <a:sym typeface="Wingdings" pitchFamily="2" charset="2"/>
                   </a:rPr>
                   <a:t> </a:t>
                 </a:r>
                 <a:r>
-                  <a:rPr lang="de-DE" sz="2000" dirty="0" err="1" smtClean="0">
+                  <a:rPr lang="de-DE" sz="2000" dirty="0" err="1">
                     <a:sym typeface="Wingdings" pitchFamily="2" charset="2"/>
                   </a:rPr>
                   <a:t>points</a:t>
                 </a:r>
-                <a:endParaRPr lang="en-US" sz="2000" dirty="0" smtClean="0">
+                <a:endParaRPr lang="en-US" sz="2000" dirty="0">
                   <a:sym typeface="Wingdings" pitchFamily="2" charset="2"/>
                 </a:endParaRPr>
               </a:p>
             </p:txBody>
           </p:sp>
         </mc:Choice>
-        <mc:Fallback>
+        <mc:Fallback xmlns="">
           <p:sp>
             <p:nvSpPr>
               <p:cNvPr id="6" name="Subtitle 2"/>
@@ -5158,13 +5205,6 @@
   <p:clrMapOvr>
     <a:masterClrMapping/>
   </p:clrMapOvr>
-  <p:timing>
-    <p:tnLst>
-      <p:par>
-        <p:cTn id="1" dur="indefinite" restart="never" nodeType="tmRoot"/>
-      </p:par>
-    </p:tnLst>
-  </p:timing>
 </p:sld>
 </file>
 
@@ -5209,20 +5249,15 @@
           <a:p>
             <a:r>
               <a:rPr lang="en-US" sz="4000" b="1" dirty="0"/>
-              <a:t>Euclidean color filter </a:t>
-            </a:r>
-            <a:r>
-              <a:rPr lang="en-US" sz="4000" b="1" dirty="0" smtClean="0"/>
-              <a:t>overview</a:t>
+              <a:t>Euclidean color filter overview</a:t>
             </a:r>
             <a:br>
-              <a:rPr lang="en-US" sz="4000" b="1" dirty="0" smtClean="0"/>
+              <a:rPr lang="en-US" sz="4000" b="1" dirty="0"/>
             </a:br>
             <a:r>
-              <a:rPr lang="en-US" sz="3200" dirty="0" smtClean="0"/>
+              <a:rPr lang="en-US" sz="3200" dirty="0"/>
               <a:t>What does the Euclidean Filter do?</a:t>
             </a:r>
-            <a:endParaRPr lang="en-US" sz="3200" dirty="0"/>
           </a:p>
         </p:txBody>
       </p:sp>
@@ -5470,66 +5505,66 @@
               <a:buChar char="-"/>
             </a:pPr>
             <a:r>
-              <a:rPr lang="de-DE" sz="2000" dirty="0" err="1" smtClean="0"/>
+              <a:rPr lang="de-DE" sz="2000" dirty="0" err="1"/>
               <a:t>Two</a:t>
             </a:r>
             <a:r>
-              <a:rPr lang="de-DE" sz="2000" dirty="0" smtClean="0"/>
+              <a:rPr lang="de-DE" sz="2000" dirty="0"/>
               <a:t> </a:t>
             </a:r>
             <a:r>
-              <a:rPr lang="de-DE" sz="2000" dirty="0" err="1" smtClean="0"/>
+              <a:rPr lang="de-DE" sz="2000" dirty="0" err="1"/>
               <a:t>parameters</a:t>
             </a:r>
             <a:r>
-              <a:rPr lang="de-DE" sz="2000" dirty="0" smtClean="0"/>
+              <a:rPr lang="de-DE" sz="2000" dirty="0"/>
               <a:t> </a:t>
             </a:r>
             <a:r>
-              <a:rPr lang="de-DE" sz="2000" dirty="0" err="1" smtClean="0"/>
+              <a:rPr lang="de-DE" sz="2000" dirty="0" err="1"/>
               <a:t>to</a:t>
             </a:r>
             <a:r>
-              <a:rPr lang="de-DE" sz="2000" dirty="0" smtClean="0"/>
+              <a:rPr lang="de-DE" sz="2000" dirty="0"/>
               <a:t> </a:t>
             </a:r>
             <a:r>
-              <a:rPr lang="de-DE" sz="2000" dirty="0" err="1" smtClean="0"/>
+              <a:rPr lang="de-DE" sz="2000" dirty="0" err="1"/>
               <a:t>specify</a:t>
             </a:r>
             <a:r>
-              <a:rPr lang="de-DE" sz="2000" dirty="0" smtClean="0"/>
+              <a:rPr lang="de-DE" sz="2000" dirty="0"/>
               <a:t>: Color </a:t>
             </a:r>
             <a:r>
-              <a:rPr lang="de-DE" sz="2000" dirty="0" err="1" smtClean="0"/>
+              <a:rPr lang="de-DE" sz="2000" dirty="0" err="1"/>
               <a:t>center</a:t>
             </a:r>
             <a:r>
-              <a:rPr lang="de-DE" sz="2000" dirty="0" smtClean="0"/>
+              <a:rPr lang="de-DE" sz="2000" dirty="0"/>
               <a:t> </a:t>
             </a:r>
             <a:r>
-              <a:rPr lang="de-DE" sz="2000" dirty="0" err="1" smtClean="0"/>
+              <a:rPr lang="de-DE" sz="2000" dirty="0" err="1"/>
               <a:t>and</a:t>
             </a:r>
             <a:r>
-              <a:rPr lang="de-DE" sz="2000" dirty="0" smtClean="0"/>
+              <a:rPr lang="de-DE" sz="2000" dirty="0"/>
               <a:t> </a:t>
             </a:r>
             <a:r>
-              <a:rPr lang="de-DE" sz="2000" dirty="0" err="1" smtClean="0"/>
+              <a:rPr lang="de-DE" sz="2000" dirty="0" err="1"/>
               <a:t>float</a:t>
             </a:r>
             <a:r>
-              <a:rPr lang="de-DE" sz="2000" dirty="0" smtClean="0"/>
+              <a:rPr lang="de-DE" sz="2000" dirty="0"/>
               <a:t> </a:t>
             </a:r>
             <a:r>
-              <a:rPr lang="de-DE" sz="2000" dirty="0" err="1" smtClean="0"/>
+              <a:rPr lang="de-DE" sz="2000" dirty="0" err="1"/>
               <a:t>radius</a:t>
             </a:r>
-            <a:endParaRPr lang="de-DE" sz="2000" dirty="0" smtClean="0"/>
+            <a:endParaRPr lang="de-DE" sz="2000" dirty="0"/>
           </a:p>
           <a:p>
             <a:pPr>
@@ -5537,38 +5572,38 @@
               <a:buChar char="-"/>
             </a:pPr>
             <a:r>
-              <a:rPr lang="de-DE" sz="2000" dirty="0" smtClean="0"/>
+              <a:rPr lang="de-DE" sz="2000" dirty="0"/>
               <a:t>Loops </a:t>
             </a:r>
             <a:r>
-              <a:rPr lang="de-DE" sz="2000" dirty="0" err="1" smtClean="0"/>
+              <a:rPr lang="de-DE" sz="2000" dirty="0" err="1"/>
               <a:t>through</a:t>
             </a:r>
             <a:r>
-              <a:rPr lang="de-DE" sz="2000" dirty="0" smtClean="0"/>
+              <a:rPr lang="de-DE" sz="2000" dirty="0"/>
               <a:t> all </a:t>
             </a:r>
             <a:r>
-              <a:rPr lang="de-DE" sz="2000" dirty="0" err="1" smtClean="0"/>
+              <a:rPr lang="de-DE" sz="2000" dirty="0" err="1"/>
               <a:t>pixel</a:t>
             </a:r>
             <a:r>
-              <a:rPr lang="de-DE" sz="2000" dirty="0" smtClean="0"/>
+              <a:rPr lang="de-DE" sz="2000" dirty="0"/>
               <a:t> </a:t>
             </a:r>
             <a:r>
-              <a:rPr lang="de-DE" sz="2000" dirty="0" err="1" smtClean="0"/>
+              <a:rPr lang="de-DE" sz="2000" dirty="0" err="1"/>
               <a:t>of</a:t>
             </a:r>
             <a:r>
-              <a:rPr lang="de-DE" sz="2000" dirty="0" smtClean="0"/>
+              <a:rPr lang="de-DE" sz="2000" dirty="0"/>
               <a:t> an </a:t>
             </a:r>
             <a:r>
-              <a:rPr lang="de-DE" sz="2000" dirty="0" err="1" smtClean="0"/>
+              <a:rPr lang="de-DE" sz="2000" dirty="0" err="1"/>
               <a:t>image</a:t>
             </a:r>
-            <a:endParaRPr lang="de-DE" sz="2000" dirty="0" smtClean="0"/>
+            <a:endParaRPr lang="de-DE" sz="2000" dirty="0"/>
           </a:p>
           <a:p>
             <a:pPr>
@@ -5576,126 +5611,122 @@
               <a:buChar char="-"/>
             </a:pPr>
             <a:r>
-              <a:rPr lang="de-DE" sz="2000" dirty="0" err="1" smtClean="0"/>
+              <a:rPr lang="de-DE" sz="2000" dirty="0" err="1"/>
               <a:t>Calculates</a:t>
-            </a:r>
-            <a:r>
-              <a:rPr lang="de-DE" sz="2000" dirty="0" smtClean="0"/>
-              <a:t> </a:t>
-            </a:r>
-            <a:r>
-              <a:rPr lang="de-DE" sz="2000" dirty="0" err="1" smtClean="0"/>
-              <a:t>the</a:t>
-            </a:r>
-            <a:r>
-              <a:rPr lang="de-DE" sz="2000" dirty="0" smtClean="0"/>
-              <a:t> </a:t>
-            </a:r>
-            <a:r>
-              <a:rPr lang="de-DE" sz="2000" dirty="0" err="1" smtClean="0"/>
-              <a:t>Euclidean</a:t>
-            </a:r>
-            <a:r>
-              <a:rPr lang="de-DE" sz="2000" dirty="0" smtClean="0"/>
-              <a:t> </a:t>
-            </a:r>
-            <a:r>
-              <a:rPr lang="de-DE" sz="2000" dirty="0" err="1" smtClean="0"/>
-              <a:t>distance</a:t>
-            </a:r>
-            <a:r>
-              <a:rPr lang="de-DE" sz="2000" dirty="0" smtClean="0"/>
-              <a:t> </a:t>
-            </a:r>
-            <a:r>
-              <a:rPr lang="de-DE" sz="2000" dirty="0" err="1" smtClean="0"/>
-              <a:t>between</a:t>
-            </a:r>
-            <a:r>
-              <a:rPr lang="de-DE" sz="2000" dirty="0" smtClean="0"/>
-              <a:t> </a:t>
-            </a:r>
-            <a:r>
-              <a:rPr lang="de-DE" sz="2000" dirty="0" err="1" smtClean="0"/>
-              <a:t>the</a:t>
             </a:r>
             <a:r>
               <a:rPr lang="de-DE" sz="2000" dirty="0"/>
               <a:t> </a:t>
             </a:r>
             <a:r>
-              <a:rPr lang="de-DE" sz="2000" dirty="0" smtClean="0"/>
-              <a:t>RGB </a:t>
-            </a:r>
-            <a:r>
-              <a:rPr lang="de-DE" sz="2000" dirty="0" err="1" smtClean="0"/>
+              <a:rPr lang="de-DE" sz="2000" dirty="0" err="1"/>
+              <a:t>the</a:t>
+            </a:r>
+            <a:r>
+              <a:rPr lang="de-DE" sz="2000" dirty="0"/>
+              <a:t> </a:t>
+            </a:r>
+            <a:r>
+              <a:rPr lang="de-DE" sz="2000" dirty="0" err="1"/>
+              <a:t>Euclidean</a:t>
+            </a:r>
+            <a:r>
+              <a:rPr lang="de-DE" sz="2000" dirty="0"/>
+              <a:t> </a:t>
+            </a:r>
+            <a:r>
+              <a:rPr lang="de-DE" sz="2000" dirty="0" err="1"/>
+              <a:t>distance</a:t>
+            </a:r>
+            <a:r>
+              <a:rPr lang="de-DE" sz="2000" dirty="0"/>
+              <a:t> </a:t>
+            </a:r>
+            <a:r>
+              <a:rPr lang="de-DE" sz="2000" dirty="0" err="1"/>
+              <a:t>between</a:t>
+            </a:r>
+            <a:r>
+              <a:rPr lang="de-DE" sz="2000" dirty="0"/>
+              <a:t> </a:t>
+            </a:r>
+            <a:r>
+              <a:rPr lang="de-DE" sz="2000" dirty="0" err="1"/>
+              <a:t>the</a:t>
+            </a:r>
+            <a:r>
+              <a:rPr lang="de-DE" sz="2000" dirty="0"/>
+              <a:t> RGB </a:t>
+            </a:r>
+            <a:r>
+              <a:rPr lang="de-DE" sz="2000" dirty="0" err="1"/>
               <a:t>value</a:t>
             </a:r>
             <a:r>
-              <a:rPr lang="de-DE" sz="2000" dirty="0" smtClean="0"/>
+              <a:rPr lang="de-DE" sz="2000" dirty="0"/>
               <a:t> </a:t>
             </a:r>
             <a:r>
-              <a:rPr lang="de-DE" sz="2000" dirty="0" err="1" smtClean="0"/>
+              <a:rPr lang="de-DE" sz="2000" dirty="0" err="1"/>
               <a:t>of</a:t>
             </a:r>
             <a:r>
-              <a:rPr lang="de-DE" sz="2000" dirty="0" smtClean="0"/>
+              <a:rPr lang="de-DE" sz="2000" dirty="0"/>
               <a:t> </a:t>
             </a:r>
             <a:r>
-              <a:rPr lang="de-DE" sz="2000" dirty="0" err="1" smtClean="0"/>
+              <a:rPr lang="de-DE" sz="2000" dirty="0" err="1"/>
               <a:t>the</a:t>
             </a:r>
             <a:r>
-              <a:rPr lang="de-DE" sz="2000" dirty="0" smtClean="0"/>
+              <a:rPr lang="de-DE" sz="2000" dirty="0"/>
               <a:t> </a:t>
             </a:r>
             <a:r>
-              <a:rPr lang="de-DE" sz="2000" dirty="0" err="1" smtClean="0"/>
+              <a:rPr lang="de-DE" sz="2000" dirty="0" err="1"/>
               <a:t>pixel</a:t>
             </a:r>
             <a:r>
-              <a:rPr lang="de-DE" sz="2000" dirty="0" smtClean="0"/>
+              <a:rPr lang="de-DE" sz="2000" dirty="0"/>
               <a:t> </a:t>
             </a:r>
             <a:r>
-              <a:rPr lang="de-DE" sz="2000" dirty="0" err="1" smtClean="0"/>
+              <a:rPr lang="de-DE" sz="2000" dirty="0" err="1"/>
               <a:t>and</a:t>
             </a:r>
             <a:r>
-              <a:rPr lang="de-DE" sz="2000" dirty="0" smtClean="0"/>
+              <a:rPr lang="de-DE" sz="2000" dirty="0"/>
               <a:t> </a:t>
             </a:r>
             <a:r>
-              <a:rPr lang="de-DE" sz="2000" dirty="0" err="1" smtClean="0"/>
+              <a:rPr lang="de-DE" sz="2000" dirty="0" err="1"/>
               <a:t>the</a:t>
             </a:r>
             <a:r>
-              <a:rPr lang="de-DE" sz="2000" dirty="0" smtClean="0"/>
+              <a:rPr lang="de-DE" sz="2000" dirty="0"/>
               <a:t> </a:t>
             </a:r>
             <a:r>
-              <a:rPr lang="de-DE" sz="2000" dirty="0" err="1" smtClean="0"/>
+              <a:rPr lang="de-DE" sz="2000" dirty="0" err="1"/>
               <a:t>specified</a:t>
             </a:r>
             <a:r>
-              <a:rPr lang="de-DE" sz="2000" dirty="0" smtClean="0"/>
+              <a:rPr lang="de-DE" sz="2000" dirty="0"/>
               <a:t> </a:t>
             </a:r>
             <a:r>
-              <a:rPr lang="de-DE" sz="2000" dirty="0" err="1" smtClean="0"/>
+              <a:rPr lang="de-DE" sz="2000" dirty="0" err="1"/>
               <a:t>center</a:t>
             </a:r>
             <a:r>
-              <a:rPr lang="de-DE" sz="2000" dirty="0" smtClean="0"/>
+              <a:rPr lang="de-DE" sz="2000" dirty="0"/>
               <a:t> </a:t>
             </a:r>
             <a:r>
-              <a:rPr lang="de-DE" sz="2000" dirty="0" err="1" smtClean="0"/>
+              <a:rPr lang="de-DE" sz="2000" dirty="0" err="1"/>
               <a:t>value</a:t>
             </a:r>
-            <a:endParaRPr lang="de-DE" sz="2000" dirty="0" smtClean="0"/>
+            <a:endParaRPr lang="de-DE" sz="2000" dirty="0"/>
           </a:p>
           <a:p>
             <a:pPr>
@@ -5703,75 +5734,75 @@
               <a:buChar char="-"/>
             </a:pPr>
             <a:r>
-              <a:rPr lang="de-DE" sz="2000" dirty="0" err="1" smtClean="0"/>
+              <a:rPr lang="de-DE" sz="2000" dirty="0" err="1"/>
               <a:t>If</a:t>
             </a:r>
             <a:r>
-              <a:rPr lang="de-DE" sz="2000" dirty="0" smtClean="0"/>
+              <a:rPr lang="de-DE" sz="2000" dirty="0"/>
               <a:t> </a:t>
             </a:r>
             <a:r>
-              <a:rPr lang="de-DE" sz="2000" dirty="0" err="1" smtClean="0"/>
+              <a:rPr lang="de-DE" sz="2000" dirty="0" err="1"/>
               <a:t>the</a:t>
             </a:r>
             <a:r>
-              <a:rPr lang="de-DE" sz="2000" dirty="0" smtClean="0"/>
+              <a:rPr lang="de-DE" sz="2000" dirty="0"/>
               <a:t> </a:t>
             </a:r>
             <a:r>
-              <a:rPr lang="de-DE" sz="2000" dirty="0" err="1" smtClean="0"/>
+              <a:rPr lang="de-DE" sz="2000" dirty="0" err="1"/>
               <a:t>the</a:t>
             </a:r>
             <a:r>
-              <a:rPr lang="de-DE" sz="2000" dirty="0" smtClean="0"/>
+              <a:rPr lang="de-DE" sz="2000" dirty="0"/>
               <a:t> </a:t>
             </a:r>
             <a:r>
-              <a:rPr lang="de-DE" sz="2000" dirty="0" err="1" smtClean="0"/>
+              <a:rPr lang="de-DE" sz="2000" dirty="0" err="1"/>
               <a:t>Euclidean</a:t>
             </a:r>
             <a:r>
-              <a:rPr lang="de-DE" sz="2000" dirty="0" smtClean="0"/>
+              <a:rPr lang="de-DE" sz="2000" dirty="0"/>
               <a:t> </a:t>
             </a:r>
             <a:r>
-              <a:rPr lang="de-DE" sz="2000" dirty="0" err="1" smtClean="0"/>
+              <a:rPr lang="de-DE" sz="2000" dirty="0" err="1"/>
               <a:t>distance</a:t>
             </a:r>
             <a:r>
-              <a:rPr lang="de-DE" sz="2000" dirty="0" smtClean="0"/>
+              <a:rPr lang="de-DE" sz="2000" dirty="0"/>
               <a:t> </a:t>
             </a:r>
             <a:r>
-              <a:rPr lang="de-DE" sz="2000" dirty="0" err="1" smtClean="0"/>
+              <a:rPr lang="de-DE" sz="2000" dirty="0" err="1"/>
               <a:t>is</a:t>
             </a:r>
             <a:r>
-              <a:rPr lang="de-DE" sz="2000" dirty="0" smtClean="0"/>
+              <a:rPr lang="de-DE" sz="2000" dirty="0"/>
               <a:t> </a:t>
             </a:r>
             <a:r>
-              <a:rPr lang="de-DE" sz="2000" dirty="0" err="1" smtClean="0"/>
+              <a:rPr lang="de-DE" sz="2000" dirty="0" err="1"/>
               <a:t>within</a:t>
             </a:r>
             <a:r>
-              <a:rPr lang="de-DE" sz="2000" dirty="0" smtClean="0"/>
+              <a:rPr lang="de-DE" sz="2000" dirty="0"/>
               <a:t> </a:t>
             </a:r>
             <a:r>
-              <a:rPr lang="de-DE" sz="2000" dirty="0" err="1" smtClean="0"/>
+              <a:rPr lang="de-DE" sz="2000" dirty="0" err="1"/>
               <a:t>the</a:t>
             </a:r>
             <a:r>
-              <a:rPr lang="de-DE" sz="2000" dirty="0" smtClean="0"/>
+              <a:rPr lang="de-DE" sz="2000" dirty="0"/>
               <a:t> </a:t>
             </a:r>
             <a:r>
-              <a:rPr lang="de-DE" sz="2000" dirty="0" err="1" smtClean="0"/>
+              <a:rPr lang="de-DE" sz="2000" dirty="0" err="1"/>
               <a:t>radius</a:t>
             </a:r>
             <a:r>
-              <a:rPr lang="de-DE" sz="2000" dirty="0" smtClean="0"/>
+              <a:rPr lang="de-DE" sz="2000" dirty="0"/>
               <a:t> </a:t>
             </a:r>
           </a:p>
@@ -5780,10 +5811,16 @@
               <a:buNone/>
             </a:pPr>
             <a:r>
-              <a:rPr lang="de-DE" sz="2000" dirty="0" smtClean="0">
+              <a:rPr lang="de-DE" sz="2000" dirty="0">
                 <a:sym typeface="Wingdings" pitchFamily="2" charset="2"/>
               </a:rPr>
-              <a:t></a:t>
+              <a:t> Pixel </a:t>
+            </a:r>
+            <a:r>
+              <a:rPr lang="de-DE" sz="2000" dirty="0" err="1">
+                <a:sym typeface="Wingdings" pitchFamily="2" charset="2"/>
+              </a:rPr>
+              <a:t>keeps</a:t>
             </a:r>
             <a:r>
               <a:rPr lang="de-DE" sz="2000" dirty="0">
@@ -5792,42 +5829,24 @@
               <a:t> </a:t>
             </a:r>
             <a:r>
-              <a:rPr lang="de-DE" sz="2000" dirty="0" smtClean="0">
-                <a:sym typeface="Wingdings" pitchFamily="2" charset="2"/>
-              </a:rPr>
-              <a:t>Pixel </a:t>
-            </a:r>
-            <a:r>
-              <a:rPr lang="de-DE" sz="2000" dirty="0" err="1" smtClean="0">
-                <a:sym typeface="Wingdings" pitchFamily="2" charset="2"/>
-              </a:rPr>
-              <a:t>keeps</a:t>
-            </a:r>
-            <a:r>
-              <a:rPr lang="de-DE" sz="2000" dirty="0" smtClean="0">
-                <a:sym typeface="Wingdings" pitchFamily="2" charset="2"/>
-              </a:rPr>
-              <a:t> </a:t>
-            </a:r>
-            <a:r>
-              <a:rPr lang="de-DE" sz="2000" dirty="0" err="1" smtClean="0">
+              <a:rPr lang="de-DE" sz="2000" dirty="0" err="1">
                 <a:sym typeface="Wingdings" pitchFamily="2" charset="2"/>
               </a:rPr>
               <a:t>its</a:t>
             </a:r>
             <a:r>
-              <a:rPr lang="de-DE" sz="2000" dirty="0" smtClean="0">
+              <a:rPr lang="de-DE" sz="2000" dirty="0">
                 <a:sym typeface="Wingdings" pitchFamily="2" charset="2"/>
               </a:rPr>
               <a:t> RGB </a:t>
             </a:r>
             <a:r>
-              <a:rPr lang="de-DE" sz="2000" dirty="0" err="1" smtClean="0">
+              <a:rPr lang="de-DE" sz="2000" dirty="0" err="1">
                 <a:sym typeface="Wingdings" pitchFamily="2" charset="2"/>
               </a:rPr>
               <a:t>value</a:t>
             </a:r>
-            <a:endParaRPr lang="de-DE" sz="2000" dirty="0" smtClean="0">
+            <a:endParaRPr lang="de-DE" sz="2000" dirty="0">
               <a:sym typeface="Wingdings" pitchFamily="2" charset="2"/>
             </a:endParaRPr>
           </a:p>
@@ -5837,134 +5856,134 @@
               <a:buChar char="-"/>
             </a:pPr>
             <a:r>
-              <a:rPr lang="de-DE" sz="2000" dirty="0" err="1" smtClean="0"/>
+              <a:rPr lang="de-DE" sz="2000" dirty="0" err="1"/>
               <a:t>If</a:t>
             </a:r>
             <a:r>
-              <a:rPr lang="de-DE" sz="2000" dirty="0" smtClean="0"/>
+              <a:rPr lang="de-DE" sz="2000" dirty="0"/>
               <a:t> </a:t>
             </a:r>
             <a:r>
-              <a:rPr lang="de-DE" sz="2000" dirty="0" err="1" smtClean="0"/>
+              <a:rPr lang="de-DE" sz="2000" dirty="0" err="1"/>
               <a:t>the</a:t>
             </a:r>
             <a:r>
-              <a:rPr lang="de-DE" sz="2000" dirty="0" smtClean="0"/>
+              <a:rPr lang="de-DE" sz="2000" dirty="0"/>
               <a:t> </a:t>
             </a:r>
             <a:r>
-              <a:rPr lang="de-DE" sz="2000" dirty="0" err="1" smtClean="0"/>
+              <a:rPr lang="de-DE" sz="2000" dirty="0" err="1"/>
               <a:t>Euclidean</a:t>
             </a:r>
             <a:r>
-              <a:rPr lang="de-DE" sz="2000" dirty="0" smtClean="0"/>
+              <a:rPr lang="de-DE" sz="2000" dirty="0"/>
               <a:t> </a:t>
             </a:r>
             <a:r>
-              <a:rPr lang="de-DE" sz="2000" dirty="0" err="1" smtClean="0"/>
+              <a:rPr lang="de-DE" sz="2000" dirty="0" err="1"/>
               <a:t>distance</a:t>
             </a:r>
             <a:r>
-              <a:rPr lang="de-DE" sz="2000" dirty="0" smtClean="0"/>
+              <a:rPr lang="de-DE" sz="2000" dirty="0"/>
               <a:t> </a:t>
             </a:r>
             <a:r>
-              <a:rPr lang="de-DE" sz="2000" dirty="0" err="1" smtClean="0"/>
+              <a:rPr lang="de-DE" sz="2000" dirty="0" err="1"/>
               <a:t>is</a:t>
             </a:r>
             <a:r>
-              <a:rPr lang="de-DE" sz="2000" dirty="0" smtClean="0"/>
+              <a:rPr lang="de-DE" sz="2000" dirty="0"/>
               <a:t> </a:t>
             </a:r>
             <a:r>
-              <a:rPr lang="de-DE" sz="2000" dirty="0" err="1" smtClean="0"/>
+              <a:rPr lang="de-DE" sz="2000" dirty="0" err="1"/>
               <a:t>bigger</a:t>
             </a:r>
             <a:r>
-              <a:rPr lang="de-DE" sz="2000" dirty="0" smtClean="0"/>
+              <a:rPr lang="de-DE" sz="2000" dirty="0"/>
               <a:t> </a:t>
             </a:r>
             <a:r>
-              <a:rPr lang="de-DE" sz="2000" dirty="0" err="1" smtClean="0"/>
+              <a:rPr lang="de-DE" sz="2000" dirty="0" err="1"/>
               <a:t>than</a:t>
             </a:r>
             <a:r>
-              <a:rPr lang="de-DE" sz="2000" dirty="0" smtClean="0"/>
+              <a:rPr lang="de-DE" sz="2000" dirty="0"/>
               <a:t> </a:t>
             </a:r>
             <a:r>
-              <a:rPr lang="de-DE" sz="2000" dirty="0" err="1" smtClean="0"/>
+              <a:rPr lang="de-DE" sz="2000" dirty="0" err="1"/>
               <a:t>the</a:t>
             </a:r>
             <a:r>
-              <a:rPr lang="de-DE" sz="2000" dirty="0" smtClean="0"/>
+              <a:rPr lang="de-DE" sz="2000" dirty="0"/>
               <a:t> </a:t>
             </a:r>
             <a:r>
-              <a:rPr lang="de-DE" sz="2000" dirty="0" err="1" smtClean="0"/>
+              <a:rPr lang="de-DE" sz="2000" dirty="0" err="1"/>
               <a:t>radius</a:t>
             </a:r>
-            <a:endParaRPr lang="de-DE" sz="2000" dirty="0" smtClean="0"/>
+            <a:endParaRPr lang="de-DE" sz="2000" dirty="0"/>
           </a:p>
           <a:p>
             <a:pPr marL="0" indent="0">
               <a:buNone/>
             </a:pPr>
             <a:r>
-              <a:rPr lang="de-DE" sz="2000" dirty="0" smtClean="0">
+              <a:rPr lang="de-DE" sz="2000" dirty="0">
                 <a:sym typeface="Wingdings" pitchFamily="2" charset="2"/>
               </a:rPr>
               <a:t> Pixel </a:t>
             </a:r>
             <a:r>
-              <a:rPr lang="de-DE" sz="2000" dirty="0" err="1" smtClean="0">
+              <a:rPr lang="de-DE" sz="2000" dirty="0" err="1">
                 <a:sym typeface="Wingdings" pitchFamily="2" charset="2"/>
               </a:rPr>
               <a:t>is</a:t>
             </a:r>
             <a:r>
-              <a:rPr lang="de-DE" sz="2000" dirty="0" smtClean="0">
+              <a:rPr lang="de-DE" sz="2000" dirty="0">
                 <a:sym typeface="Wingdings" pitchFamily="2" charset="2"/>
               </a:rPr>
               <a:t> </a:t>
             </a:r>
             <a:r>
-              <a:rPr lang="de-DE" sz="2000" dirty="0" err="1" smtClean="0">
+              <a:rPr lang="de-DE" sz="2000" dirty="0" err="1">
                 <a:sym typeface="Wingdings" pitchFamily="2" charset="2"/>
               </a:rPr>
               <a:t>set</a:t>
             </a:r>
             <a:r>
-              <a:rPr lang="de-DE" sz="2000" dirty="0" smtClean="0">
+              <a:rPr lang="de-DE" sz="2000" dirty="0">
                 <a:sym typeface="Wingdings" pitchFamily="2" charset="2"/>
               </a:rPr>
               <a:t> </a:t>
             </a:r>
             <a:r>
-              <a:rPr lang="de-DE" sz="2000" dirty="0" err="1" smtClean="0">
+              <a:rPr lang="de-DE" sz="2000" dirty="0" err="1">
                 <a:sym typeface="Wingdings" pitchFamily="2" charset="2"/>
               </a:rPr>
               <a:t>to</a:t>
             </a:r>
             <a:r>
-              <a:rPr lang="de-DE" sz="2000" dirty="0" smtClean="0">
+              <a:rPr lang="de-DE" sz="2000" dirty="0">
                 <a:sym typeface="Wingdings" pitchFamily="2" charset="2"/>
               </a:rPr>
               <a:t> </a:t>
             </a:r>
             <a:r>
-              <a:rPr lang="de-DE" sz="2000" dirty="0" err="1" smtClean="0">
+              <a:rPr lang="de-DE" sz="2000" dirty="0" err="1">
                 <a:sym typeface="Wingdings" pitchFamily="2" charset="2"/>
               </a:rPr>
               <a:t>color</a:t>
             </a:r>
             <a:r>
-              <a:rPr lang="de-DE" sz="2000" dirty="0" smtClean="0">
+              <a:rPr lang="de-DE" sz="2000" dirty="0">
                 <a:sym typeface="Wingdings" pitchFamily="2" charset="2"/>
               </a:rPr>
               <a:t> Black.</a:t>
             </a:r>
-            <a:endParaRPr lang="de-DE" sz="2000" dirty="0" smtClean="0"/>
+            <a:endParaRPr lang="de-DE" sz="2000" dirty="0"/>
           </a:p>
         </p:txBody>
       </p:sp>
@@ -6013,10 +6032,9 @@
           <a:lstStyle/>
           <a:p>
             <a:r>
-              <a:rPr lang="en-US" dirty="0" smtClean="0"/>
+              <a:rPr lang="en-US" dirty="0"/>
               <a:t>If/else statement for filtering</a:t>
             </a:r>
-            <a:endParaRPr lang="en-US" dirty="0"/>
           </a:p>
         </p:txBody>
       </p:sp>
@@ -6030,13 +6048,6 @@
   <p:clrMapOvr>
     <a:masterClrMapping/>
   </p:clrMapOvr>
-  <p:timing>
-    <p:tnLst>
-      <p:par>
-        <p:cTn id="1" dur="indefinite" restart="never" nodeType="tmRoot"/>
-      </p:par>
-    </p:tnLst>
-  </p:timing>
 </p:sld>
 </file>
 
@@ -6081,20 +6092,15 @@
           <a:p>
             <a:r>
               <a:rPr lang="en-US" sz="4000" b="1" dirty="0"/>
-              <a:t>Euclidean color filter </a:t>
-            </a:r>
-            <a:r>
-              <a:rPr lang="en-US" sz="4000" b="1" dirty="0" smtClean="0"/>
-              <a:t>overview</a:t>
+              <a:t>Euclidean color filter overview</a:t>
             </a:r>
             <a:br>
-              <a:rPr lang="en-US" sz="4000" b="1" dirty="0" smtClean="0"/>
+              <a:rPr lang="en-US" sz="4000" b="1" dirty="0"/>
             </a:br>
             <a:r>
-              <a:rPr lang="en-US" sz="3200" dirty="0" smtClean="0"/>
+              <a:rPr lang="en-US" sz="3200" dirty="0"/>
               <a:t>Example</a:t>
             </a:r>
-            <a:endParaRPr lang="en-US" sz="3200" dirty="0"/>
           </a:p>
         </p:txBody>
       </p:sp>
@@ -6263,13 +6269,6 @@
   <p:clrMapOvr>
     <a:masterClrMapping/>
   </p:clrMapOvr>
-  <p:timing>
-    <p:tnLst>
-      <p:par>
-        <p:cTn id="1" dur="indefinite" restart="never" nodeType="tmRoot"/>
-      </p:par>
-    </p:tnLst>
-  </p:timing>
 </p:sld>
 </file>
 
@@ -6314,14 +6313,10 @@
           <a:p>
             <a:r>
               <a:rPr lang="en-US" sz="4000" b="1" dirty="0"/>
-              <a:t>Architecture of the </a:t>
-            </a:r>
-            <a:r>
-              <a:rPr lang="en-US" sz="4000" b="1" dirty="0" smtClean="0"/>
-              <a:t>Project</a:t>
+              <a:t>Architecture of the Project</a:t>
             </a:r>
             <a:br>
-              <a:rPr lang="en-US" sz="4000" b="1" dirty="0" smtClean="0"/>
+              <a:rPr lang="en-US" sz="4000" b="1" dirty="0"/>
             </a:br>
             <a:endParaRPr lang="en-US" sz="3200" dirty="0"/>
           </a:p>
@@ -6425,11 +6420,11 @@
           <a:lstStyle/>
           <a:p>
             <a:r>
-              <a:rPr lang="en-US" dirty="0" smtClean="0"/>
+              <a:rPr lang="en-US" dirty="0"/>
               <a:t>The main architecture of the </a:t>
             </a:r>
             <a:r>
-              <a:rPr lang="en-US" dirty="0" err="1" smtClean="0"/>
+              <a:rPr lang="en-US" dirty="0" err="1"/>
               <a:t>progream</a:t>
             </a:r>
             <a:endParaRPr lang="en-US" dirty="0"/>
@@ -6481,18 +6476,9 @@
           <a:lstStyle/>
           <a:p>
             <a:r>
-              <a:rPr lang="en-US" dirty="0" smtClean="0"/>
-              <a:t>Overview of the classes which </a:t>
-            </a:r>
-            <a:r>
               <a:rPr lang="en-US" dirty="0"/>
-              <a:t>are </a:t>
-            </a:r>
-            <a:r>
-              <a:rPr lang="en-US" dirty="0" smtClean="0"/>
-              <a:t>necessary for the filter</a:t>
-            </a:r>
-            <a:endParaRPr lang="en-US" dirty="0"/>
+              <a:t>Overview of the classes which are necessary for the filter</a:t>
+            </a:r>
           </a:p>
         </p:txBody>
       </p:sp>
@@ -6506,13 +6492,6 @@
   <p:clrMapOvr>
     <a:masterClrMapping/>
   </p:clrMapOvr>
-  <p:timing>
-    <p:tnLst>
-      <p:par>
-        <p:cTn id="1" dur="indefinite" restart="never" nodeType="tmRoot"/>
-      </p:par>
-    </p:tnLst>
-  </p:timing>
 </p:sld>
 </file>
 
@@ -6556,7 +6535,7 @@
           <a:lstStyle/>
           <a:p>
             <a:r>
-              <a:rPr lang="en-US" sz="4000" b="1" dirty="0" smtClean="0"/>
+              <a:rPr lang="en-US" sz="4000" b="1" dirty="0"/>
               <a:t>Implementation</a:t>
             </a:r>
             <a:endParaRPr lang="en-US" sz="3200" dirty="0"/>
@@ -6640,7 +6619,7 @@
           <a:p>
             <a:pPr algn="ctr"/>
             <a:r>
-              <a:rPr lang="en-US" sz="4000" b="1" dirty="0" smtClean="0"/>
+              <a:rPr lang="en-US" sz="4000" b="1" dirty="0"/>
               <a:t>Code explanation…</a:t>
             </a:r>
           </a:p>
@@ -6656,13 +6635,6 @@
   <p:clrMapOvr>
     <a:masterClrMapping/>
   </p:clrMapOvr>
-  <p:timing>
-    <p:tnLst>
-      <p:par>
-        <p:cTn id="1" dur="indefinite" restart="never" nodeType="tmRoot"/>
-      </p:par>
-    </p:tnLst>
-  </p:timing>
 </p:sld>
 </file>
 
@@ -6730,14 +6702,14 @@
           <a:p>
             <a:pPr algn="ctr"/>
             <a:r>
-              <a:rPr lang="en-US" sz="7200" b="1" dirty="0" smtClean="0"/>
+              <a:rPr lang="en-US" sz="7200" b="1" dirty="0"/>
               <a:t>Thank you for your attention!</a:t>
             </a:r>
           </a:p>
           <a:p>
             <a:pPr algn="ctr"/>
             <a:r>
-              <a:rPr lang="en-US" sz="5400" dirty="0" smtClean="0">
+              <a:rPr lang="en-US" sz="5400" dirty="0">
                 <a:ln w="22225">
                   <a:solidFill>
                     <a:schemeClr val="accent2"/>
@@ -6754,7 +6726,7 @@
               </a:rPr>
               <a:t>Do you have any questions?</a:t>
             </a:r>
-            <a:endParaRPr lang="en-US" sz="5400" cap="none" spc="0" dirty="0" smtClean="0">
+            <a:endParaRPr lang="en-US" sz="5400" cap="none" spc="0" dirty="0">
               <a:ln w="22225">
                 <a:solidFill>
                   <a:schemeClr val="accent2"/>
@@ -6782,13 +6754,6 @@
   <p:clrMapOvr>
     <a:masterClrMapping/>
   </p:clrMapOvr>
-  <p:timing>
-    <p:tnLst>
-      <p:par>
-        <p:cTn id="1" dur="indefinite" restart="never" nodeType="tmRoot"/>
-      </p:par>
-    </p:tnLst>
-  </p:timing>
 </p:sld>
 </file>
 
@@ -7071,7 +7036,7 @@
   <a:extraClrSchemeLst/>
   <a:extLst>
     <a:ext uri="{05A4C25C-085E-4340-85A3-A5531E510DB2}">
-      <thm15:themeFamily xmlns="" xmlns:thm15="http://schemas.microsoft.com/office/thememl/2012/main" name="Office Theme" id="{62F939B6-93AF-4DB8-9C6B-D6C7DFDC589F}" vid="{4A3C46E8-61CC-4603-A589-7422A47A8E4A}"/>
+      <thm15:themeFamily xmlns:thm15="http://schemas.microsoft.com/office/thememl/2012/main" name="Office Theme" id="{62F939B6-93AF-4DB8-9C6B-D6C7DFDC589F}" vid="{4A3C46E8-61CC-4603-A589-7422A47A8E4A}"/>
     </a:ext>
   </a:extLst>
 </a:theme>
@@ -7332,7 +7297,7 @@
   <a:extraClrSchemeLst/>
   <a:extLst>
     <a:ext uri="{05A4C25C-085E-4340-85A3-A5531E510DB2}">
-      <thm15:themeFamily xmlns="" xmlns:thm15="http://schemas.microsoft.com/office/thememl/2012/main" name="Office Theme" id="{62F939B6-93AF-4DB8-9C6B-D6C7DFDC589F}" vid="{4A3C46E8-61CC-4603-A589-7422A47A8E4A}"/>
+      <thm15:themeFamily xmlns:thm15="http://schemas.microsoft.com/office/thememl/2012/main" name="Office Theme" id="{62F939B6-93AF-4DB8-9C6B-D6C7DFDC589F}" vid="{4A3C46E8-61CC-4603-A589-7422A47A8E4A}"/>
     </a:ext>
   </a:extLst>
 </a:theme>

</xml_diff>

<commit_message>
PPT added for project
</commit_message>
<xml_diff>
--- a/LearningApi/EuclideanColorFilter/Documentation/Updated_Documents/Presentation_DeepaliBetkar.pptx
+++ b/LearningApi/EuclideanColorFilter/Documentation/Updated_Documents/Presentation_DeepaliBetkar.pptx
@@ -6536,7 +6536,14 @@
           <a:p>
             <a:r>
               <a:rPr lang="en-US" sz="4000" b="1" dirty="0"/>
-              <a:t>Implementation</a:t>
+              <a:t>Euclidean Color Filter Code </a:t>
+            </a:r>
+            <a:br>
+              <a:rPr lang="en-US" sz="4000" b="1" dirty="0"/>
+            </a:br>
+            <a:r>
+              <a:rPr lang="en-US" sz="4000" b="1" dirty="0"/>
+              <a:t>Implementation:</a:t>
             </a:r>
             <a:endParaRPr lang="en-US" sz="3200" dirty="0"/>
           </a:p>
@@ -6603,8 +6610,8 @@
         </p:nvSpPr>
         <p:spPr>
           <a:xfrm>
-            <a:off x="0" y="2828735"/>
-            <a:ext cx="10450037" cy="707886"/>
+            <a:off x="514905" y="1985294"/>
+            <a:ext cx="10450037" cy="3693319"/>
           </a:xfrm>
           <a:prstGeom prst="rect">
             <a:avLst/>
@@ -6617,11 +6624,119 @@
           </a:bodyPr>
           <a:lstStyle/>
           <a:p>
-            <a:pPr algn="ctr"/>
-            <a:r>
-              <a:rPr lang="en-US" sz="4000" b="1" dirty="0"/>
-              <a:t>Code explanation…</a:t>
-            </a:r>
+            <a:pPr marL="457200" indent="-457200">
+              <a:buFont typeface="Wingdings" panose="05000000000000000000" pitchFamily="2" charset="2"/>
+              <a:buChar char="Ø"/>
+            </a:pPr>
+            <a:r>
+              <a:rPr lang="en-US" sz="2600" b="1" dirty="0" err="1">
+                <a:hlinkClick r:id="rId3">
+                  <a:extLst>
+                    <a:ext uri="{A12FA001-AC4F-418D-AE19-62706E023703}">
+                      <ahyp:hlinkClr xmlns:ahyp="http://schemas.microsoft.com/office/drawing/2018/hyperlinkcolor" val="tx"/>
+                    </a:ext>
+                  </a:extLst>
+                </a:hlinkClick>
+              </a:rPr>
+              <a:t>EuclideanFilterModule.cs</a:t>
+            </a:r>
+            <a:endParaRPr lang="en-US" sz="2600" b="1" dirty="0"/>
+          </a:p>
+          <a:p>
+            <a:pPr marL="457200" indent="-457200">
+              <a:buFont typeface="Wingdings" panose="05000000000000000000" pitchFamily="2" charset="2"/>
+              <a:buChar char="Ø"/>
+            </a:pPr>
+            <a:endParaRPr lang="en-US" sz="2600" b="1" dirty="0"/>
+          </a:p>
+          <a:p>
+            <a:pPr marL="457200" indent="-457200">
+              <a:buFont typeface="Wingdings" panose="05000000000000000000" pitchFamily="2" charset="2"/>
+              <a:buChar char="Ø"/>
+            </a:pPr>
+            <a:r>
+              <a:rPr lang="en-US" sz="2600" b="1" dirty="0" err="1">
+                <a:hlinkClick r:id="rId4">
+                  <a:extLst>
+                    <a:ext uri="{A12FA001-AC4F-418D-AE19-62706E023703}">
+                      <ahyp:hlinkClr xmlns:ahyp="http://schemas.microsoft.com/office/drawing/2018/hyperlinkcolor" val="tx"/>
+                    </a:ext>
+                  </a:extLst>
+                </a:hlinkClick>
+              </a:rPr>
+              <a:t>EuclideanFilterModuleExtension.cs</a:t>
+            </a:r>
+            <a:endParaRPr lang="en-US" sz="2600" b="1" dirty="0"/>
+          </a:p>
+          <a:p>
+            <a:pPr marL="457200" indent="-457200">
+              <a:buFont typeface="Wingdings" panose="05000000000000000000" pitchFamily="2" charset="2"/>
+              <a:buChar char="Ø"/>
+            </a:pPr>
+            <a:endParaRPr lang="en-US" sz="2600" b="1" dirty="0"/>
+          </a:p>
+          <a:p>
+            <a:pPr marL="457200" indent="-457200">
+              <a:buFont typeface="Wingdings" panose="05000000000000000000" pitchFamily="2" charset="2"/>
+              <a:buChar char="Ø"/>
+            </a:pPr>
+            <a:r>
+              <a:rPr lang="en-US" sz="2600" b="1" dirty="0" err="1">
+                <a:hlinkClick r:id="rId5">
+                  <a:extLst>
+                    <a:ext uri="{A12FA001-AC4F-418D-AE19-62706E023703}">
+                      <ahyp:hlinkClr xmlns:ahyp="http://schemas.microsoft.com/office/drawing/2018/hyperlinkcolor" val="tx"/>
+                    </a:ext>
+                  </a:extLst>
+                </a:hlinkClick>
+              </a:rPr>
+              <a:t>GetAndSetPixel.cs</a:t>
+            </a:r>
+            <a:endParaRPr lang="en-US" sz="2600" b="1" dirty="0"/>
+          </a:p>
+          <a:p>
+            <a:pPr marL="457200" indent="-457200">
+              <a:buFont typeface="Wingdings" panose="05000000000000000000" pitchFamily="2" charset="2"/>
+              <a:buChar char="Ø"/>
+            </a:pPr>
+            <a:endParaRPr lang="en-US" sz="2600" b="1" dirty="0"/>
+          </a:p>
+          <a:p>
+            <a:pPr marL="457200" indent="-457200">
+              <a:buFont typeface="Wingdings" panose="05000000000000000000" pitchFamily="2" charset="2"/>
+              <a:buChar char="Ø"/>
+            </a:pPr>
+            <a:r>
+              <a:rPr lang="en-US" sz="2600" b="1" dirty="0" err="1">
+                <a:hlinkClick r:id="rId6">
+                  <a:extLst>
+                    <a:ext uri="{A12FA001-AC4F-418D-AE19-62706E023703}">
+                      <ahyp:hlinkClr xmlns:ahyp="http://schemas.microsoft.com/office/drawing/2018/hyperlinkcolor" val="tx"/>
+                    </a:ext>
+                  </a:extLst>
+                </a:hlinkClick>
+              </a:rPr>
+              <a:t>CalDistance.cs</a:t>
+            </a:r>
+            <a:endParaRPr lang="en-US" sz="2600" b="1" dirty="0"/>
+          </a:p>
+          <a:p>
+            <a:pPr marL="457200" indent="-457200">
+              <a:buFont typeface="Wingdings" panose="05000000000000000000" pitchFamily="2" charset="2"/>
+              <a:buChar char="Ø"/>
+            </a:pPr>
+            <a:endParaRPr lang="en-US" sz="2600" b="1" dirty="0"/>
+          </a:p>
+          <a:p>
+            <a:pPr marL="457200" indent="-457200">
+              <a:buFont typeface="Wingdings" panose="05000000000000000000" pitchFamily="2" charset="2"/>
+              <a:buChar char="Ø"/>
+            </a:pPr>
+            <a:r>
+              <a:rPr lang="en-US" sz="2600" b="1" dirty="0" err="1"/>
+              <a:t>EuclideanFilterTest</a:t>
+            </a:r>
+            <a:endParaRPr lang="en-US" sz="2600" b="1" dirty="0"/>
           </a:p>
         </p:txBody>
       </p:sp>

</xml_diff>